<commit_message>
Update Number guessing game ppt.pptx
</commit_message>
<xml_diff>
--- a/Number guessing game ppt.pptx
+++ b/Number guessing game ppt.pptx
@@ -1,22 +1,22 @@
 
 <file path=ppt/presentation.xml><?xml version="1.0" encoding="utf-8"?>
-<p:presentation xmlns:a="http://schemas.openxmlformats.org/drawingml/2006/main" xmlns:r="http://schemas.openxmlformats.org/officeDocument/2006/relationships" xmlns:p="http://schemas.openxmlformats.org/presentationml/2006/main" saveSubsetFonts="1">
+<p:presentation xmlns:a="http://schemas.openxmlformats.org/drawingml/2006/main" xmlns:r="http://schemas.openxmlformats.org/officeDocument/2006/relationships" xmlns:p="http://schemas.openxmlformats.org/presentationml/2006/main">
   <p:sldMasterIdLst>
     <p:sldMasterId id="2147483648" r:id="rId1"/>
   </p:sldMasterIdLst>
   <p:notesMasterIdLst>
-    <p:notesMasterId r:id="rId11"/>
+    <p:notesMasterId r:id="rId12"/>
   </p:notesMasterIdLst>
   <p:sldIdLst>
-    <p:sldId id="256" r:id="rId2"/>
-    <p:sldId id="257" r:id="rId3"/>
-    <p:sldId id="263" r:id="rId4"/>
-    <p:sldId id="259" r:id="rId5"/>
-    <p:sldId id="264" r:id="rId6"/>
-    <p:sldId id="258" r:id="rId7"/>
-    <p:sldId id="260" r:id="rId8"/>
-    <p:sldId id="261" r:id="rId9"/>
-    <p:sldId id="262" r:id="rId10"/>
+    <p:sldId id="256" r:id="rId3"/>
+    <p:sldId id="257" r:id="rId4"/>
+    <p:sldId id="263" r:id="rId5"/>
+    <p:sldId id="259" r:id="rId6"/>
+    <p:sldId id="264" r:id="rId7"/>
+    <p:sldId id="258" r:id="rId8"/>
+    <p:sldId id="260" r:id="rId9"/>
+    <p:sldId id="261" r:id="rId10"/>
+    <p:sldId id="262" r:id="rId11"/>
   </p:sldIdLst>
   <p:sldSz cx="12192000" cy="6858000"/>
   <p:notesSz cx="6858000" cy="9144000"/>
@@ -115,20 +115,7 @@
       </a:defRPr>
     </a:lvl9pPr>
   </p:defaultTextStyle>
-  <p:extLst>
-    <p:ext uri="{EFAFB233-063F-42B5-8137-9DF3F51BA10A}">
-      <p15:sldGuideLst xmlns:p15="http://schemas.microsoft.com/office/powerpoint/2012/main"/>
-    </p:ext>
-  </p:extLst>
 </p:presentation>
-</file>
-
-<file path=ppt/revisionInfo.xml><?xml version="1.0" encoding="utf-8"?>
-<p1510:revInfo xmlns:a="http://schemas.openxmlformats.org/drawingml/2006/main" xmlns:r="http://schemas.openxmlformats.org/officeDocument/2006/relationships" xmlns:p1510="http://schemas.microsoft.com/office/powerpoint/2015/10/main">
-  <p1510:revLst>
-    <p1510:client id="{9A937502-E50D-46D2-8149-FD87AF5E0636}" v="1" dt="2025-10-27T15:00:27.549"/>
-  </p1510:revLst>
-</p1510:revInfo>
 </file>
 
 <file path=ppt/notesMasters/notesMaster1.xml><?xml version="1.0" encoding="utf-8"?>
@@ -213,7 +200,6 @@
           <a:p>
             <a:fld id="{86EF56DB-6447-4E9A-8D0B-327B958AB26D}" type="datetimeFigureOut">
               <a:rPr lang="en-US" smtClean="0"/>
-              <a:t>10/27/2025</a:t>
             </a:fld>
             <a:endParaRPr lang="en-US"/>
           </a:p>
@@ -280,6 +266,7 @@
               <a:rPr lang="en-US"/>
               <a:t>Click to edit Master text styles</a:t>
             </a:r>
+            <a:endParaRPr lang="en-US"/>
           </a:p>
           <a:p>
             <a:pPr lvl="1"/>
@@ -287,6 +274,7 @@
               <a:rPr lang="en-US"/>
               <a:t>Second level</a:t>
             </a:r>
+            <a:endParaRPr lang="en-US"/>
           </a:p>
           <a:p>
             <a:pPr lvl="2"/>
@@ -294,6 +282,7 @@
               <a:rPr lang="en-US"/>
               <a:t>Third level</a:t>
             </a:r>
+            <a:endParaRPr lang="en-US"/>
           </a:p>
           <a:p>
             <a:pPr lvl="3"/>
@@ -301,6 +290,7 @@
               <a:rPr lang="en-US"/>
               <a:t>Fourth level</a:t>
             </a:r>
+            <a:endParaRPr lang="en-US"/>
           </a:p>
           <a:p>
             <a:pPr lvl="4"/>
@@ -308,6 +298,7 @@
               <a:rPr lang="en-US"/>
               <a:t>Fifth level</a:t>
             </a:r>
+            <a:endParaRPr lang="en-US"/>
           </a:p>
         </p:txBody>
       </p:sp>
@@ -371,18 +362,12 @@
           <a:p>
             <a:fld id="{87476D98-D61B-4655-9F07-885518B2E134}" type="slidenum">
               <a:rPr lang="en-US" smtClean="0"/>
-              <a:t>‹#›</a:t>
             </a:fld>
             <a:endParaRPr lang="en-US"/>
           </a:p>
         </p:txBody>
       </p:sp>
     </p:spTree>
-    <p:extLst>
-      <p:ext uri="{BB962C8B-B14F-4D97-AF65-F5344CB8AC3E}">
-        <p14:creationId xmlns:p14="http://schemas.microsoft.com/office/powerpoint/2010/main" val="905179487"/>
-      </p:ext>
-    </p:extLst>
   </p:cSld>
   <p:clrMap bg1="lt1" tx1="dk1" bg2="lt2" tx2="dk2" accent1="accent1" accent2="accent2" accent3="accent3" accent4="accent4" accent5="accent5" accent6="accent6" hlink="hlink" folHlink="folHlink"/>
   <p:notesStyle>
@@ -499,13 +484,7 @@
       </p:grpSpPr>
       <p:sp>
         <p:nvSpPr>
-          <p:cNvPr id="2" name="Title 1">
-            <a:extLst>
-              <a:ext uri="{FF2B5EF4-FFF2-40B4-BE49-F238E27FC236}">
-                <a16:creationId xmlns:a16="http://schemas.microsoft.com/office/drawing/2014/main" id="{7B42F0ED-5252-4C0D-3BA2-BA6ECDF9073A}"/>
-              </a:ext>
-            </a:extLst>
-          </p:cNvPr>
+          <p:cNvPr id="2" name="Title 1"/>
           <p:cNvSpPr>
             <a:spLocks noGrp="1"/>
           </p:cNvSpPr>
@@ -531,18 +510,13 @@
               <a:rPr lang="en-US"/>
               <a:t>Click to edit Master title style</a:t>
             </a:r>
-          </a:p>
-        </p:txBody>
-      </p:sp>
-      <p:sp>
-        <p:nvSpPr>
-          <p:cNvPr id="3" name="Subtitle 2">
-            <a:extLst>
-              <a:ext uri="{FF2B5EF4-FFF2-40B4-BE49-F238E27FC236}">
-                <a16:creationId xmlns:a16="http://schemas.microsoft.com/office/drawing/2014/main" id="{34F6E366-4DE2-8E81-1DC3-0AEE197AF61D}"/>
-              </a:ext>
-            </a:extLst>
-          </p:cNvPr>
+            <a:endParaRPr lang="en-US"/>
+          </a:p>
+        </p:txBody>
+      </p:sp>
+      <p:sp>
+        <p:nvSpPr>
+          <p:cNvPr id="3" name="Subtitle 2"/>
           <p:cNvSpPr>
             <a:spLocks noGrp="1"/>
           </p:cNvSpPr>
@@ -601,18 +575,13 @@
               <a:rPr lang="en-US"/>
               <a:t>Click to edit Master subtitle style</a:t>
             </a:r>
-          </a:p>
-        </p:txBody>
-      </p:sp>
-      <p:sp>
-        <p:nvSpPr>
-          <p:cNvPr id="4" name="Date Placeholder 3">
-            <a:extLst>
-              <a:ext uri="{FF2B5EF4-FFF2-40B4-BE49-F238E27FC236}">
-                <a16:creationId xmlns:a16="http://schemas.microsoft.com/office/drawing/2014/main" id="{58C19ECA-A45F-0986-41DE-E73470F3D075}"/>
-              </a:ext>
-            </a:extLst>
-          </p:cNvPr>
+            <a:endParaRPr lang="en-US"/>
+          </a:p>
+        </p:txBody>
+      </p:sp>
+      <p:sp>
+        <p:nvSpPr>
+          <p:cNvPr id="4" name="Date Placeholder 3"/>
           <p:cNvSpPr>
             <a:spLocks noGrp="1"/>
           </p:cNvSpPr>
@@ -627,7 +596,6 @@
           <a:p>
             <a:fld id="{36A8A127-BB09-41A4-B1CB-CF09F8E9604A}" type="datetime1">
               <a:rPr lang="en-US" smtClean="0"/>
-              <a:t>10/27/2025</a:t>
             </a:fld>
             <a:endParaRPr lang="en-US"/>
           </a:p>
@@ -635,13 +603,7 @@
       </p:sp>
       <p:sp>
         <p:nvSpPr>
-          <p:cNvPr id="5" name="Footer Placeholder 4">
-            <a:extLst>
-              <a:ext uri="{FF2B5EF4-FFF2-40B4-BE49-F238E27FC236}">
-                <a16:creationId xmlns:a16="http://schemas.microsoft.com/office/drawing/2014/main" id="{246DC80E-2DDD-1136-4BC6-B4406DBF7B71}"/>
-              </a:ext>
-            </a:extLst>
-          </p:cNvPr>
+          <p:cNvPr id="5" name="Footer Placeholder 4"/>
           <p:cNvSpPr>
             <a:spLocks noGrp="1"/>
           </p:cNvSpPr>
@@ -660,13 +622,7 @@
       </p:sp>
       <p:sp>
         <p:nvSpPr>
-          <p:cNvPr id="6" name="Slide Number Placeholder 5">
-            <a:extLst>
-              <a:ext uri="{FF2B5EF4-FFF2-40B4-BE49-F238E27FC236}">
-                <a16:creationId xmlns:a16="http://schemas.microsoft.com/office/drawing/2014/main" id="{D3C6432E-64B5-4716-F794-CD0C848FE6AA}"/>
-              </a:ext>
-            </a:extLst>
-          </p:cNvPr>
+          <p:cNvPr id="6" name="Slide Number Placeholder 5"/>
           <p:cNvSpPr>
             <a:spLocks noGrp="1"/>
           </p:cNvSpPr>
@@ -681,18 +637,12 @@
           <a:p>
             <a:fld id="{1FCEF87E-815D-44D1-B0AB-39AF0402D6A8}" type="slidenum">
               <a:rPr lang="en-US" smtClean="0"/>
-              <a:t>‹#›</a:t>
             </a:fld>
             <a:endParaRPr lang="en-US"/>
           </a:p>
         </p:txBody>
       </p:sp>
     </p:spTree>
-    <p:extLst>
-      <p:ext uri="{BB962C8B-B14F-4D97-AF65-F5344CB8AC3E}">
-        <p14:creationId xmlns:p14="http://schemas.microsoft.com/office/powerpoint/2010/main" val="2144428388"/>
-      </p:ext>
-    </p:extLst>
   </p:cSld>
   <p:clrMapOvr>
     <a:masterClrMapping/>
@@ -719,13 +669,7 @@
       </p:grpSpPr>
       <p:sp>
         <p:nvSpPr>
-          <p:cNvPr id="2" name="Title 1">
-            <a:extLst>
-              <a:ext uri="{FF2B5EF4-FFF2-40B4-BE49-F238E27FC236}">
-                <a16:creationId xmlns:a16="http://schemas.microsoft.com/office/drawing/2014/main" id="{D6F050B6-05B4-E3FE-22C0-B823946C349F}"/>
-              </a:ext>
-            </a:extLst>
-          </p:cNvPr>
+          <p:cNvPr id="2" name="Title 1"/>
           <p:cNvSpPr>
             <a:spLocks noGrp="1"/>
           </p:cNvSpPr>
@@ -742,18 +686,13 @@
               <a:rPr lang="en-US"/>
               <a:t>Click to edit Master title style</a:t>
             </a:r>
-          </a:p>
-        </p:txBody>
-      </p:sp>
-      <p:sp>
-        <p:nvSpPr>
-          <p:cNvPr id="3" name="Vertical Text Placeholder 2">
-            <a:extLst>
-              <a:ext uri="{FF2B5EF4-FFF2-40B4-BE49-F238E27FC236}">
-                <a16:creationId xmlns:a16="http://schemas.microsoft.com/office/drawing/2014/main" id="{A534B519-CE0F-EF5E-0363-067F1B0DB1EF}"/>
-              </a:ext>
-            </a:extLst>
-          </p:cNvPr>
+            <a:endParaRPr lang="en-US"/>
+          </a:p>
+        </p:txBody>
+      </p:sp>
+      <p:sp>
+        <p:nvSpPr>
+          <p:cNvPr id="3" name="Vertical Text Placeholder 2"/>
           <p:cNvSpPr>
             <a:spLocks noGrp="1"/>
           </p:cNvSpPr>
@@ -771,6 +710,7 @@
               <a:rPr lang="en-US"/>
               <a:t>Click to edit Master text styles</a:t>
             </a:r>
+            <a:endParaRPr lang="en-US"/>
           </a:p>
           <a:p>
             <a:pPr lvl="1"/>
@@ -778,6 +718,7 @@
               <a:rPr lang="en-US"/>
               <a:t>Second level</a:t>
             </a:r>
+            <a:endParaRPr lang="en-US"/>
           </a:p>
           <a:p>
             <a:pPr lvl="2"/>
@@ -785,6 +726,7 @@
               <a:rPr lang="en-US"/>
               <a:t>Third level</a:t>
             </a:r>
+            <a:endParaRPr lang="en-US"/>
           </a:p>
           <a:p>
             <a:pPr lvl="3"/>
@@ -792,6 +734,7 @@
               <a:rPr lang="en-US"/>
               <a:t>Fourth level</a:t>
             </a:r>
+            <a:endParaRPr lang="en-US"/>
           </a:p>
           <a:p>
             <a:pPr lvl="4"/>
@@ -799,18 +742,13 @@
               <a:rPr lang="en-US"/>
               <a:t>Fifth level</a:t>
             </a:r>
-          </a:p>
-        </p:txBody>
-      </p:sp>
-      <p:sp>
-        <p:nvSpPr>
-          <p:cNvPr id="4" name="Date Placeholder 3">
-            <a:extLst>
-              <a:ext uri="{FF2B5EF4-FFF2-40B4-BE49-F238E27FC236}">
-                <a16:creationId xmlns:a16="http://schemas.microsoft.com/office/drawing/2014/main" id="{69E2CA70-5E41-1433-D1D4-58B7EECA7D33}"/>
-              </a:ext>
-            </a:extLst>
-          </p:cNvPr>
+            <a:endParaRPr lang="en-US"/>
+          </a:p>
+        </p:txBody>
+      </p:sp>
+      <p:sp>
+        <p:nvSpPr>
+          <p:cNvPr id="4" name="Date Placeholder 3"/>
           <p:cNvSpPr>
             <a:spLocks noGrp="1"/>
           </p:cNvSpPr>
@@ -825,7 +763,6 @@
           <a:p>
             <a:fld id="{850BF149-3A71-4B38-9BDE-7A4D7C7AB1AD}" type="datetime1">
               <a:rPr lang="en-US" smtClean="0"/>
-              <a:t>10/27/2025</a:t>
             </a:fld>
             <a:endParaRPr lang="en-US"/>
           </a:p>
@@ -833,13 +770,7 @@
       </p:sp>
       <p:sp>
         <p:nvSpPr>
-          <p:cNvPr id="5" name="Footer Placeholder 4">
-            <a:extLst>
-              <a:ext uri="{FF2B5EF4-FFF2-40B4-BE49-F238E27FC236}">
-                <a16:creationId xmlns:a16="http://schemas.microsoft.com/office/drawing/2014/main" id="{4A27E013-1DD3-69EC-2DB2-F95CD3491572}"/>
-              </a:ext>
-            </a:extLst>
-          </p:cNvPr>
+          <p:cNvPr id="5" name="Footer Placeholder 4"/>
           <p:cNvSpPr>
             <a:spLocks noGrp="1"/>
           </p:cNvSpPr>
@@ -858,13 +789,7 @@
       </p:sp>
       <p:sp>
         <p:nvSpPr>
-          <p:cNvPr id="6" name="Slide Number Placeholder 5">
-            <a:extLst>
-              <a:ext uri="{FF2B5EF4-FFF2-40B4-BE49-F238E27FC236}">
-                <a16:creationId xmlns:a16="http://schemas.microsoft.com/office/drawing/2014/main" id="{3D12FAA7-8459-22BB-DD92-45D2DCDBB7A1}"/>
-              </a:ext>
-            </a:extLst>
-          </p:cNvPr>
+          <p:cNvPr id="6" name="Slide Number Placeholder 5"/>
           <p:cNvSpPr>
             <a:spLocks noGrp="1"/>
           </p:cNvSpPr>
@@ -879,18 +804,12 @@
           <a:p>
             <a:fld id="{1FCEF87E-815D-44D1-B0AB-39AF0402D6A8}" type="slidenum">
               <a:rPr lang="en-US" smtClean="0"/>
-              <a:t>‹#›</a:t>
             </a:fld>
             <a:endParaRPr lang="en-US"/>
           </a:p>
         </p:txBody>
       </p:sp>
     </p:spTree>
-    <p:extLst>
-      <p:ext uri="{BB962C8B-B14F-4D97-AF65-F5344CB8AC3E}">
-        <p14:creationId xmlns:p14="http://schemas.microsoft.com/office/powerpoint/2010/main" val="84219062"/>
-      </p:ext>
-    </p:extLst>
   </p:cSld>
   <p:clrMapOvr>
     <a:masterClrMapping/>
@@ -917,13 +836,7 @@
       </p:grpSpPr>
       <p:sp>
         <p:nvSpPr>
-          <p:cNvPr id="2" name="Vertical Title 1">
-            <a:extLst>
-              <a:ext uri="{FF2B5EF4-FFF2-40B4-BE49-F238E27FC236}">
-                <a16:creationId xmlns:a16="http://schemas.microsoft.com/office/drawing/2014/main" id="{2665F096-56EB-9C2E-FB81-FEE0A0CAD974}"/>
-              </a:ext>
-            </a:extLst>
-          </p:cNvPr>
+          <p:cNvPr id="2" name="Vertical Title 1"/>
           <p:cNvSpPr>
             <a:spLocks noGrp="1"/>
           </p:cNvSpPr>
@@ -945,18 +858,13 @@
               <a:rPr lang="en-US"/>
               <a:t>Click to edit Master title style</a:t>
             </a:r>
-          </a:p>
-        </p:txBody>
-      </p:sp>
-      <p:sp>
-        <p:nvSpPr>
-          <p:cNvPr id="3" name="Vertical Text Placeholder 2">
-            <a:extLst>
-              <a:ext uri="{FF2B5EF4-FFF2-40B4-BE49-F238E27FC236}">
-                <a16:creationId xmlns:a16="http://schemas.microsoft.com/office/drawing/2014/main" id="{AF2D9855-6F39-E67A-6BE9-0AC527E97219}"/>
-              </a:ext>
-            </a:extLst>
-          </p:cNvPr>
+            <a:endParaRPr lang="en-US"/>
+          </a:p>
+        </p:txBody>
+      </p:sp>
+      <p:sp>
+        <p:nvSpPr>
+          <p:cNvPr id="3" name="Vertical Text Placeholder 2"/>
           <p:cNvSpPr>
             <a:spLocks noGrp="1"/>
           </p:cNvSpPr>
@@ -979,6 +887,7 @@
               <a:rPr lang="en-US"/>
               <a:t>Click to edit Master text styles</a:t>
             </a:r>
+            <a:endParaRPr lang="en-US"/>
           </a:p>
           <a:p>
             <a:pPr lvl="1"/>
@@ -986,6 +895,7 @@
               <a:rPr lang="en-US"/>
               <a:t>Second level</a:t>
             </a:r>
+            <a:endParaRPr lang="en-US"/>
           </a:p>
           <a:p>
             <a:pPr lvl="2"/>
@@ -993,6 +903,7 @@
               <a:rPr lang="en-US"/>
               <a:t>Third level</a:t>
             </a:r>
+            <a:endParaRPr lang="en-US"/>
           </a:p>
           <a:p>
             <a:pPr lvl="3"/>
@@ -1000,6 +911,7 @@
               <a:rPr lang="en-US"/>
               <a:t>Fourth level</a:t>
             </a:r>
+            <a:endParaRPr lang="en-US"/>
           </a:p>
           <a:p>
             <a:pPr lvl="4"/>
@@ -1007,18 +919,13 @@
               <a:rPr lang="en-US"/>
               <a:t>Fifth level</a:t>
             </a:r>
-          </a:p>
-        </p:txBody>
-      </p:sp>
-      <p:sp>
-        <p:nvSpPr>
-          <p:cNvPr id="4" name="Date Placeholder 3">
-            <a:extLst>
-              <a:ext uri="{FF2B5EF4-FFF2-40B4-BE49-F238E27FC236}">
-                <a16:creationId xmlns:a16="http://schemas.microsoft.com/office/drawing/2014/main" id="{F5C113E1-9951-703E-A152-D5CEEC0EEDDB}"/>
-              </a:ext>
-            </a:extLst>
-          </p:cNvPr>
+            <a:endParaRPr lang="en-US"/>
+          </a:p>
+        </p:txBody>
+      </p:sp>
+      <p:sp>
+        <p:nvSpPr>
+          <p:cNvPr id="4" name="Date Placeholder 3"/>
           <p:cNvSpPr>
             <a:spLocks noGrp="1"/>
           </p:cNvSpPr>
@@ -1033,7 +940,6 @@
           <a:p>
             <a:fld id="{25415CF1-83E4-4056-B983-BD617F30DAFA}" type="datetime1">
               <a:rPr lang="en-US" smtClean="0"/>
-              <a:t>10/27/2025</a:t>
             </a:fld>
             <a:endParaRPr lang="en-US"/>
           </a:p>
@@ -1041,13 +947,7 @@
       </p:sp>
       <p:sp>
         <p:nvSpPr>
-          <p:cNvPr id="5" name="Footer Placeholder 4">
-            <a:extLst>
-              <a:ext uri="{FF2B5EF4-FFF2-40B4-BE49-F238E27FC236}">
-                <a16:creationId xmlns:a16="http://schemas.microsoft.com/office/drawing/2014/main" id="{A7463D87-637E-E53B-45EF-5E53B2925E31}"/>
-              </a:ext>
-            </a:extLst>
-          </p:cNvPr>
+          <p:cNvPr id="5" name="Footer Placeholder 4"/>
           <p:cNvSpPr>
             <a:spLocks noGrp="1"/>
           </p:cNvSpPr>
@@ -1066,13 +966,7 @@
       </p:sp>
       <p:sp>
         <p:nvSpPr>
-          <p:cNvPr id="6" name="Slide Number Placeholder 5">
-            <a:extLst>
-              <a:ext uri="{FF2B5EF4-FFF2-40B4-BE49-F238E27FC236}">
-                <a16:creationId xmlns:a16="http://schemas.microsoft.com/office/drawing/2014/main" id="{E75677AB-ED08-1C04-AEC4-B8B3B85BC40F}"/>
-              </a:ext>
-            </a:extLst>
-          </p:cNvPr>
+          <p:cNvPr id="6" name="Slide Number Placeholder 5"/>
           <p:cNvSpPr>
             <a:spLocks noGrp="1"/>
           </p:cNvSpPr>
@@ -1087,18 +981,12 @@
           <a:p>
             <a:fld id="{1FCEF87E-815D-44D1-B0AB-39AF0402D6A8}" type="slidenum">
               <a:rPr lang="en-US" smtClean="0"/>
-              <a:t>‹#›</a:t>
             </a:fld>
             <a:endParaRPr lang="en-US"/>
           </a:p>
         </p:txBody>
       </p:sp>
     </p:spTree>
-    <p:extLst>
-      <p:ext uri="{BB962C8B-B14F-4D97-AF65-F5344CB8AC3E}">
-        <p14:creationId xmlns:p14="http://schemas.microsoft.com/office/powerpoint/2010/main" val="996424092"/>
-      </p:ext>
-    </p:extLst>
   </p:cSld>
   <p:clrMapOvr>
     <a:masterClrMapping/>
@@ -1125,13 +1013,7 @@
       </p:grpSpPr>
       <p:sp>
         <p:nvSpPr>
-          <p:cNvPr id="2" name="Title 1">
-            <a:extLst>
-              <a:ext uri="{FF2B5EF4-FFF2-40B4-BE49-F238E27FC236}">
-                <a16:creationId xmlns:a16="http://schemas.microsoft.com/office/drawing/2014/main" id="{95275F44-3844-F881-3DC9-E55F3A5BB2A9}"/>
-              </a:ext>
-            </a:extLst>
-          </p:cNvPr>
+          <p:cNvPr id="2" name="Title 1"/>
           <p:cNvSpPr>
             <a:spLocks noGrp="1"/>
           </p:cNvSpPr>
@@ -1148,18 +1030,13 @@
               <a:rPr lang="en-US"/>
               <a:t>Click to edit Master title style</a:t>
             </a:r>
-          </a:p>
-        </p:txBody>
-      </p:sp>
-      <p:sp>
-        <p:nvSpPr>
-          <p:cNvPr id="3" name="Content Placeholder 2">
-            <a:extLst>
-              <a:ext uri="{FF2B5EF4-FFF2-40B4-BE49-F238E27FC236}">
-                <a16:creationId xmlns:a16="http://schemas.microsoft.com/office/drawing/2014/main" id="{88B5DD6E-70DC-EC37-F363-8CA0371D48CA}"/>
-              </a:ext>
-            </a:extLst>
-          </p:cNvPr>
+            <a:endParaRPr lang="en-US"/>
+          </a:p>
+        </p:txBody>
+      </p:sp>
+      <p:sp>
+        <p:nvSpPr>
+          <p:cNvPr id="3" name="Content Placeholder 2"/>
           <p:cNvSpPr>
             <a:spLocks noGrp="1"/>
           </p:cNvSpPr>
@@ -1177,6 +1054,7 @@
               <a:rPr lang="en-US"/>
               <a:t>Click to edit Master text styles</a:t>
             </a:r>
+            <a:endParaRPr lang="en-US"/>
           </a:p>
           <a:p>
             <a:pPr lvl="1"/>
@@ -1184,6 +1062,7 @@
               <a:rPr lang="en-US"/>
               <a:t>Second level</a:t>
             </a:r>
+            <a:endParaRPr lang="en-US"/>
           </a:p>
           <a:p>
             <a:pPr lvl="2"/>
@@ -1191,6 +1070,7 @@
               <a:rPr lang="en-US"/>
               <a:t>Third level</a:t>
             </a:r>
+            <a:endParaRPr lang="en-US"/>
           </a:p>
           <a:p>
             <a:pPr lvl="3"/>
@@ -1198,6 +1078,7 @@
               <a:rPr lang="en-US"/>
               <a:t>Fourth level</a:t>
             </a:r>
+            <a:endParaRPr lang="en-US"/>
           </a:p>
           <a:p>
             <a:pPr lvl="4"/>
@@ -1205,18 +1086,13 @@
               <a:rPr lang="en-US"/>
               <a:t>Fifth level</a:t>
             </a:r>
-          </a:p>
-        </p:txBody>
-      </p:sp>
-      <p:sp>
-        <p:nvSpPr>
-          <p:cNvPr id="4" name="Date Placeholder 3">
-            <a:extLst>
-              <a:ext uri="{FF2B5EF4-FFF2-40B4-BE49-F238E27FC236}">
-                <a16:creationId xmlns:a16="http://schemas.microsoft.com/office/drawing/2014/main" id="{0E884CC4-4338-D905-6FCE-6141610CE918}"/>
-              </a:ext>
-            </a:extLst>
-          </p:cNvPr>
+            <a:endParaRPr lang="en-US"/>
+          </a:p>
+        </p:txBody>
+      </p:sp>
+      <p:sp>
+        <p:nvSpPr>
+          <p:cNvPr id="4" name="Date Placeholder 3"/>
           <p:cNvSpPr>
             <a:spLocks noGrp="1"/>
           </p:cNvSpPr>
@@ -1231,7 +1107,6 @@
           <a:p>
             <a:fld id="{42A9C543-C1A5-4BB5-A80B-9531F5C51CEB}" type="datetime1">
               <a:rPr lang="en-US" smtClean="0"/>
-              <a:t>10/27/2025</a:t>
             </a:fld>
             <a:endParaRPr lang="en-US"/>
           </a:p>
@@ -1239,13 +1114,7 @@
       </p:sp>
       <p:sp>
         <p:nvSpPr>
-          <p:cNvPr id="5" name="Footer Placeholder 4">
-            <a:extLst>
-              <a:ext uri="{FF2B5EF4-FFF2-40B4-BE49-F238E27FC236}">
-                <a16:creationId xmlns:a16="http://schemas.microsoft.com/office/drawing/2014/main" id="{AD46F4CB-E19E-BF21-CA04-20FBF9E0B02D}"/>
-              </a:ext>
-            </a:extLst>
-          </p:cNvPr>
+          <p:cNvPr id="5" name="Footer Placeholder 4"/>
           <p:cNvSpPr>
             <a:spLocks noGrp="1"/>
           </p:cNvSpPr>
@@ -1264,13 +1133,7 @@
       </p:sp>
       <p:sp>
         <p:nvSpPr>
-          <p:cNvPr id="6" name="Slide Number Placeholder 5">
-            <a:extLst>
-              <a:ext uri="{FF2B5EF4-FFF2-40B4-BE49-F238E27FC236}">
-                <a16:creationId xmlns:a16="http://schemas.microsoft.com/office/drawing/2014/main" id="{C4C561CA-A7D9-921E-283C-D2D26EC9D331}"/>
-              </a:ext>
-            </a:extLst>
-          </p:cNvPr>
+          <p:cNvPr id="6" name="Slide Number Placeholder 5"/>
           <p:cNvSpPr>
             <a:spLocks noGrp="1"/>
           </p:cNvSpPr>
@@ -1285,18 +1148,12 @@
           <a:p>
             <a:fld id="{1FCEF87E-815D-44D1-B0AB-39AF0402D6A8}" type="slidenum">
               <a:rPr lang="en-US" smtClean="0"/>
-              <a:t>‹#›</a:t>
             </a:fld>
             <a:endParaRPr lang="en-US"/>
           </a:p>
         </p:txBody>
       </p:sp>
     </p:spTree>
-    <p:extLst>
-      <p:ext uri="{BB962C8B-B14F-4D97-AF65-F5344CB8AC3E}">
-        <p14:creationId xmlns:p14="http://schemas.microsoft.com/office/powerpoint/2010/main" val="3855382817"/>
-      </p:ext>
-    </p:extLst>
   </p:cSld>
   <p:clrMapOvr>
     <a:masterClrMapping/>
@@ -1323,13 +1180,7 @@
       </p:grpSpPr>
       <p:sp>
         <p:nvSpPr>
-          <p:cNvPr id="2" name="Title 1">
-            <a:extLst>
-              <a:ext uri="{FF2B5EF4-FFF2-40B4-BE49-F238E27FC236}">
-                <a16:creationId xmlns:a16="http://schemas.microsoft.com/office/drawing/2014/main" id="{299F0DB8-4328-6842-4C20-194E16496B3B}"/>
-              </a:ext>
-            </a:extLst>
-          </p:cNvPr>
+          <p:cNvPr id="2" name="Title 1"/>
           <p:cNvSpPr>
             <a:spLocks noGrp="1"/>
           </p:cNvSpPr>
@@ -1355,18 +1206,13 @@
               <a:rPr lang="en-US"/>
               <a:t>Click to edit Master title style</a:t>
             </a:r>
-          </a:p>
-        </p:txBody>
-      </p:sp>
-      <p:sp>
-        <p:nvSpPr>
-          <p:cNvPr id="3" name="Text Placeholder 2">
-            <a:extLst>
-              <a:ext uri="{FF2B5EF4-FFF2-40B4-BE49-F238E27FC236}">
-                <a16:creationId xmlns:a16="http://schemas.microsoft.com/office/drawing/2014/main" id="{FD1C16DD-B055-C373-DB9C-1095E3A7F618}"/>
-              </a:ext>
-            </a:extLst>
-          </p:cNvPr>
+            <a:endParaRPr lang="en-US"/>
+          </a:p>
+        </p:txBody>
+      </p:sp>
+      <p:sp>
+        <p:nvSpPr>
+          <p:cNvPr id="3" name="Text Placeholder 2"/>
           <p:cNvSpPr>
             <a:spLocks noGrp="1"/>
           </p:cNvSpPr>
@@ -1480,18 +1326,13 @@
               <a:rPr lang="en-US"/>
               <a:t>Click to edit Master text styles</a:t>
             </a:r>
-          </a:p>
-        </p:txBody>
-      </p:sp>
-      <p:sp>
-        <p:nvSpPr>
-          <p:cNvPr id="4" name="Date Placeholder 3">
-            <a:extLst>
-              <a:ext uri="{FF2B5EF4-FFF2-40B4-BE49-F238E27FC236}">
-                <a16:creationId xmlns:a16="http://schemas.microsoft.com/office/drawing/2014/main" id="{C0308B3A-5B20-B104-4DC9-F294FE85DC4F}"/>
-              </a:ext>
-            </a:extLst>
-          </p:cNvPr>
+            <a:endParaRPr lang="en-US"/>
+          </a:p>
+        </p:txBody>
+      </p:sp>
+      <p:sp>
+        <p:nvSpPr>
+          <p:cNvPr id="4" name="Date Placeholder 3"/>
           <p:cNvSpPr>
             <a:spLocks noGrp="1"/>
           </p:cNvSpPr>
@@ -1506,7 +1347,6 @@
           <a:p>
             <a:fld id="{85DB2ABE-BEC8-4A12-8AF2-3E9347C9F9C5}" type="datetime1">
               <a:rPr lang="en-US" smtClean="0"/>
-              <a:t>10/27/2025</a:t>
             </a:fld>
             <a:endParaRPr lang="en-US"/>
           </a:p>
@@ -1514,13 +1354,7 @@
       </p:sp>
       <p:sp>
         <p:nvSpPr>
-          <p:cNvPr id="5" name="Footer Placeholder 4">
-            <a:extLst>
-              <a:ext uri="{FF2B5EF4-FFF2-40B4-BE49-F238E27FC236}">
-                <a16:creationId xmlns:a16="http://schemas.microsoft.com/office/drawing/2014/main" id="{242F6EF1-C2BF-E0B8-5AD2-1E80894A9227}"/>
-              </a:ext>
-            </a:extLst>
-          </p:cNvPr>
+          <p:cNvPr id="5" name="Footer Placeholder 4"/>
           <p:cNvSpPr>
             <a:spLocks noGrp="1"/>
           </p:cNvSpPr>
@@ -1539,13 +1373,7 @@
       </p:sp>
       <p:sp>
         <p:nvSpPr>
-          <p:cNvPr id="6" name="Slide Number Placeholder 5">
-            <a:extLst>
-              <a:ext uri="{FF2B5EF4-FFF2-40B4-BE49-F238E27FC236}">
-                <a16:creationId xmlns:a16="http://schemas.microsoft.com/office/drawing/2014/main" id="{673C3E5B-79C1-F551-EB78-424972E416AB}"/>
-              </a:ext>
-            </a:extLst>
-          </p:cNvPr>
+          <p:cNvPr id="6" name="Slide Number Placeholder 5"/>
           <p:cNvSpPr>
             <a:spLocks noGrp="1"/>
           </p:cNvSpPr>
@@ -1560,18 +1388,12 @@
           <a:p>
             <a:fld id="{1FCEF87E-815D-44D1-B0AB-39AF0402D6A8}" type="slidenum">
               <a:rPr lang="en-US" smtClean="0"/>
-              <a:t>‹#›</a:t>
             </a:fld>
             <a:endParaRPr lang="en-US"/>
           </a:p>
         </p:txBody>
       </p:sp>
     </p:spTree>
-    <p:extLst>
-      <p:ext uri="{BB962C8B-B14F-4D97-AF65-F5344CB8AC3E}">
-        <p14:creationId xmlns:p14="http://schemas.microsoft.com/office/powerpoint/2010/main" val="2362975113"/>
-      </p:ext>
-    </p:extLst>
   </p:cSld>
   <p:clrMapOvr>
     <a:masterClrMapping/>
@@ -1598,13 +1420,7 @@
       </p:grpSpPr>
       <p:sp>
         <p:nvSpPr>
-          <p:cNvPr id="2" name="Title 1">
-            <a:extLst>
-              <a:ext uri="{FF2B5EF4-FFF2-40B4-BE49-F238E27FC236}">
-                <a16:creationId xmlns:a16="http://schemas.microsoft.com/office/drawing/2014/main" id="{684FA2CF-D4B2-C0EA-7D8B-9997981DFC68}"/>
-              </a:ext>
-            </a:extLst>
-          </p:cNvPr>
+          <p:cNvPr id="2" name="Title 1"/>
           <p:cNvSpPr>
             <a:spLocks noGrp="1"/>
           </p:cNvSpPr>
@@ -1621,18 +1437,13 @@
               <a:rPr lang="en-US"/>
               <a:t>Click to edit Master title style</a:t>
             </a:r>
-          </a:p>
-        </p:txBody>
-      </p:sp>
-      <p:sp>
-        <p:nvSpPr>
-          <p:cNvPr id="3" name="Content Placeholder 2">
-            <a:extLst>
-              <a:ext uri="{FF2B5EF4-FFF2-40B4-BE49-F238E27FC236}">
-                <a16:creationId xmlns:a16="http://schemas.microsoft.com/office/drawing/2014/main" id="{3C8EC816-FAB0-61B5-B8A9-3CEEDE3AC643}"/>
-              </a:ext>
-            </a:extLst>
-          </p:cNvPr>
+            <a:endParaRPr lang="en-US"/>
+          </a:p>
+        </p:txBody>
+      </p:sp>
+      <p:sp>
+        <p:nvSpPr>
+          <p:cNvPr id="3" name="Content Placeholder 2"/>
           <p:cNvSpPr>
             <a:spLocks noGrp="1"/>
           </p:cNvSpPr>
@@ -1655,6 +1466,7 @@
               <a:rPr lang="en-US"/>
               <a:t>Click to edit Master text styles</a:t>
             </a:r>
+            <a:endParaRPr lang="en-US"/>
           </a:p>
           <a:p>
             <a:pPr lvl="1"/>
@@ -1662,6 +1474,7 @@
               <a:rPr lang="en-US"/>
               <a:t>Second level</a:t>
             </a:r>
+            <a:endParaRPr lang="en-US"/>
           </a:p>
           <a:p>
             <a:pPr lvl="2"/>
@@ -1669,6 +1482,7 @@
               <a:rPr lang="en-US"/>
               <a:t>Third level</a:t>
             </a:r>
+            <a:endParaRPr lang="en-US"/>
           </a:p>
           <a:p>
             <a:pPr lvl="3"/>
@@ -1676,6 +1490,7 @@
               <a:rPr lang="en-US"/>
               <a:t>Fourth level</a:t>
             </a:r>
+            <a:endParaRPr lang="en-US"/>
           </a:p>
           <a:p>
             <a:pPr lvl="4"/>
@@ -1683,18 +1498,13 @@
               <a:rPr lang="en-US"/>
               <a:t>Fifth level</a:t>
             </a:r>
-          </a:p>
-        </p:txBody>
-      </p:sp>
-      <p:sp>
-        <p:nvSpPr>
-          <p:cNvPr id="4" name="Content Placeholder 3">
-            <a:extLst>
-              <a:ext uri="{FF2B5EF4-FFF2-40B4-BE49-F238E27FC236}">
-                <a16:creationId xmlns:a16="http://schemas.microsoft.com/office/drawing/2014/main" id="{B6888030-9606-40F3-F568-569861E67BB3}"/>
-              </a:ext>
-            </a:extLst>
-          </p:cNvPr>
+            <a:endParaRPr lang="en-US"/>
+          </a:p>
+        </p:txBody>
+      </p:sp>
+      <p:sp>
+        <p:nvSpPr>
+          <p:cNvPr id="4" name="Content Placeholder 3"/>
           <p:cNvSpPr>
             <a:spLocks noGrp="1"/>
           </p:cNvSpPr>
@@ -1717,6 +1527,7 @@
               <a:rPr lang="en-US"/>
               <a:t>Click to edit Master text styles</a:t>
             </a:r>
+            <a:endParaRPr lang="en-US"/>
           </a:p>
           <a:p>
             <a:pPr lvl="1"/>
@@ -1724,6 +1535,7 @@
               <a:rPr lang="en-US"/>
               <a:t>Second level</a:t>
             </a:r>
+            <a:endParaRPr lang="en-US"/>
           </a:p>
           <a:p>
             <a:pPr lvl="2"/>
@@ -1731,6 +1543,7 @@
               <a:rPr lang="en-US"/>
               <a:t>Third level</a:t>
             </a:r>
+            <a:endParaRPr lang="en-US"/>
           </a:p>
           <a:p>
             <a:pPr lvl="3"/>
@@ -1738,6 +1551,7 @@
               <a:rPr lang="en-US"/>
               <a:t>Fourth level</a:t>
             </a:r>
+            <a:endParaRPr lang="en-US"/>
           </a:p>
           <a:p>
             <a:pPr lvl="4"/>
@@ -1745,18 +1559,13 @@
               <a:rPr lang="en-US"/>
               <a:t>Fifth level</a:t>
             </a:r>
-          </a:p>
-        </p:txBody>
-      </p:sp>
-      <p:sp>
-        <p:nvSpPr>
-          <p:cNvPr id="5" name="Date Placeholder 4">
-            <a:extLst>
-              <a:ext uri="{FF2B5EF4-FFF2-40B4-BE49-F238E27FC236}">
-                <a16:creationId xmlns:a16="http://schemas.microsoft.com/office/drawing/2014/main" id="{1F26BC2E-18CA-513E-BBD3-A4A6A46824FE}"/>
-              </a:ext>
-            </a:extLst>
-          </p:cNvPr>
+            <a:endParaRPr lang="en-US"/>
+          </a:p>
+        </p:txBody>
+      </p:sp>
+      <p:sp>
+        <p:nvSpPr>
+          <p:cNvPr id="5" name="Date Placeholder 4"/>
           <p:cNvSpPr>
             <a:spLocks noGrp="1"/>
           </p:cNvSpPr>
@@ -1771,7 +1580,6 @@
           <a:p>
             <a:fld id="{E457CA91-FD83-4EFE-93EA-63992C03614F}" type="datetime1">
               <a:rPr lang="en-US" smtClean="0"/>
-              <a:t>10/27/2025</a:t>
             </a:fld>
             <a:endParaRPr lang="en-US"/>
           </a:p>
@@ -1779,13 +1587,7 @@
       </p:sp>
       <p:sp>
         <p:nvSpPr>
-          <p:cNvPr id="6" name="Footer Placeholder 5">
-            <a:extLst>
-              <a:ext uri="{FF2B5EF4-FFF2-40B4-BE49-F238E27FC236}">
-                <a16:creationId xmlns:a16="http://schemas.microsoft.com/office/drawing/2014/main" id="{7610C424-8EE7-DCF3-92CA-9943CA217BA3}"/>
-              </a:ext>
-            </a:extLst>
-          </p:cNvPr>
+          <p:cNvPr id="6" name="Footer Placeholder 5"/>
           <p:cNvSpPr>
             <a:spLocks noGrp="1"/>
           </p:cNvSpPr>
@@ -1804,13 +1606,7 @@
       </p:sp>
       <p:sp>
         <p:nvSpPr>
-          <p:cNvPr id="7" name="Slide Number Placeholder 6">
-            <a:extLst>
-              <a:ext uri="{FF2B5EF4-FFF2-40B4-BE49-F238E27FC236}">
-                <a16:creationId xmlns:a16="http://schemas.microsoft.com/office/drawing/2014/main" id="{13B02771-6578-A3F3-2DE5-957F26935FA9}"/>
-              </a:ext>
-            </a:extLst>
-          </p:cNvPr>
+          <p:cNvPr id="7" name="Slide Number Placeholder 6"/>
           <p:cNvSpPr>
             <a:spLocks noGrp="1"/>
           </p:cNvSpPr>
@@ -1825,18 +1621,12 @@
           <a:p>
             <a:fld id="{1FCEF87E-815D-44D1-B0AB-39AF0402D6A8}" type="slidenum">
               <a:rPr lang="en-US" smtClean="0"/>
-              <a:t>‹#›</a:t>
             </a:fld>
             <a:endParaRPr lang="en-US"/>
           </a:p>
         </p:txBody>
       </p:sp>
     </p:spTree>
-    <p:extLst>
-      <p:ext uri="{BB962C8B-B14F-4D97-AF65-F5344CB8AC3E}">
-        <p14:creationId xmlns:p14="http://schemas.microsoft.com/office/powerpoint/2010/main" val="1846501228"/>
-      </p:ext>
-    </p:extLst>
   </p:cSld>
   <p:clrMapOvr>
     <a:masterClrMapping/>
@@ -1863,13 +1653,7 @@
       </p:grpSpPr>
       <p:sp>
         <p:nvSpPr>
-          <p:cNvPr id="2" name="Title 1">
-            <a:extLst>
-              <a:ext uri="{FF2B5EF4-FFF2-40B4-BE49-F238E27FC236}">
-                <a16:creationId xmlns:a16="http://schemas.microsoft.com/office/drawing/2014/main" id="{443A56EB-15F3-DA5A-FC5F-C8A9854DFC27}"/>
-              </a:ext>
-            </a:extLst>
-          </p:cNvPr>
+          <p:cNvPr id="2" name="Title 1"/>
           <p:cNvSpPr>
             <a:spLocks noGrp="1"/>
           </p:cNvSpPr>
@@ -1891,18 +1675,13 @@
               <a:rPr lang="en-US"/>
               <a:t>Click to edit Master title style</a:t>
             </a:r>
-          </a:p>
-        </p:txBody>
-      </p:sp>
-      <p:sp>
-        <p:nvSpPr>
-          <p:cNvPr id="3" name="Text Placeholder 2">
-            <a:extLst>
-              <a:ext uri="{FF2B5EF4-FFF2-40B4-BE49-F238E27FC236}">
-                <a16:creationId xmlns:a16="http://schemas.microsoft.com/office/drawing/2014/main" id="{E44F55B3-769C-0F68-56E4-09A31651F092}"/>
-              </a:ext>
-            </a:extLst>
-          </p:cNvPr>
+            <a:endParaRPr lang="en-US"/>
+          </a:p>
+        </p:txBody>
+      </p:sp>
+      <p:sp>
+        <p:nvSpPr>
+          <p:cNvPr id="3" name="Text Placeholder 2"/>
           <p:cNvSpPr>
             <a:spLocks noGrp="1"/>
           </p:cNvSpPr>
@@ -1962,18 +1741,13 @@
               <a:rPr lang="en-US"/>
               <a:t>Click to edit Master text styles</a:t>
             </a:r>
-          </a:p>
-        </p:txBody>
-      </p:sp>
-      <p:sp>
-        <p:nvSpPr>
-          <p:cNvPr id="4" name="Content Placeholder 3">
-            <a:extLst>
-              <a:ext uri="{FF2B5EF4-FFF2-40B4-BE49-F238E27FC236}">
-                <a16:creationId xmlns:a16="http://schemas.microsoft.com/office/drawing/2014/main" id="{949390E3-482E-14E5-E93E-3EFDFCA024CE}"/>
-              </a:ext>
-            </a:extLst>
-          </p:cNvPr>
+            <a:endParaRPr lang="en-US"/>
+          </a:p>
+        </p:txBody>
+      </p:sp>
+      <p:sp>
+        <p:nvSpPr>
+          <p:cNvPr id="4" name="Content Placeholder 3"/>
           <p:cNvSpPr>
             <a:spLocks noGrp="1"/>
           </p:cNvSpPr>
@@ -1996,6 +1770,7 @@
               <a:rPr lang="en-US"/>
               <a:t>Click to edit Master text styles</a:t>
             </a:r>
+            <a:endParaRPr lang="en-US"/>
           </a:p>
           <a:p>
             <a:pPr lvl="1"/>
@@ -2003,6 +1778,7 @@
               <a:rPr lang="en-US"/>
               <a:t>Second level</a:t>
             </a:r>
+            <a:endParaRPr lang="en-US"/>
           </a:p>
           <a:p>
             <a:pPr lvl="2"/>
@@ -2010,6 +1786,7 @@
               <a:rPr lang="en-US"/>
               <a:t>Third level</a:t>
             </a:r>
+            <a:endParaRPr lang="en-US"/>
           </a:p>
           <a:p>
             <a:pPr lvl="3"/>
@@ -2017,6 +1794,7 @@
               <a:rPr lang="en-US"/>
               <a:t>Fourth level</a:t>
             </a:r>
+            <a:endParaRPr lang="en-US"/>
           </a:p>
           <a:p>
             <a:pPr lvl="4"/>
@@ -2024,18 +1802,13 @@
               <a:rPr lang="en-US"/>
               <a:t>Fifth level</a:t>
             </a:r>
-          </a:p>
-        </p:txBody>
-      </p:sp>
-      <p:sp>
-        <p:nvSpPr>
-          <p:cNvPr id="5" name="Text Placeholder 4">
-            <a:extLst>
-              <a:ext uri="{FF2B5EF4-FFF2-40B4-BE49-F238E27FC236}">
-                <a16:creationId xmlns:a16="http://schemas.microsoft.com/office/drawing/2014/main" id="{8A5F7FD4-A0A2-100E-247B-0439DA6A8EAF}"/>
-              </a:ext>
-            </a:extLst>
-          </p:cNvPr>
+            <a:endParaRPr lang="en-US"/>
+          </a:p>
+        </p:txBody>
+      </p:sp>
+      <p:sp>
+        <p:nvSpPr>
+          <p:cNvPr id="5" name="Text Placeholder 4"/>
           <p:cNvSpPr>
             <a:spLocks noGrp="1"/>
           </p:cNvSpPr>
@@ -2095,18 +1868,13 @@
               <a:rPr lang="en-US"/>
               <a:t>Click to edit Master text styles</a:t>
             </a:r>
-          </a:p>
-        </p:txBody>
-      </p:sp>
-      <p:sp>
-        <p:nvSpPr>
-          <p:cNvPr id="6" name="Content Placeholder 5">
-            <a:extLst>
-              <a:ext uri="{FF2B5EF4-FFF2-40B4-BE49-F238E27FC236}">
-                <a16:creationId xmlns:a16="http://schemas.microsoft.com/office/drawing/2014/main" id="{9AB19785-7F9E-F7E7-9989-FBA2A2436A08}"/>
-              </a:ext>
-            </a:extLst>
-          </p:cNvPr>
+            <a:endParaRPr lang="en-US"/>
+          </a:p>
+        </p:txBody>
+      </p:sp>
+      <p:sp>
+        <p:nvSpPr>
+          <p:cNvPr id="6" name="Content Placeholder 5"/>
           <p:cNvSpPr>
             <a:spLocks noGrp="1"/>
           </p:cNvSpPr>
@@ -2129,6 +1897,7 @@
               <a:rPr lang="en-US"/>
               <a:t>Click to edit Master text styles</a:t>
             </a:r>
+            <a:endParaRPr lang="en-US"/>
           </a:p>
           <a:p>
             <a:pPr lvl="1"/>
@@ -2136,6 +1905,7 @@
               <a:rPr lang="en-US"/>
               <a:t>Second level</a:t>
             </a:r>
+            <a:endParaRPr lang="en-US"/>
           </a:p>
           <a:p>
             <a:pPr lvl="2"/>
@@ -2143,6 +1913,7 @@
               <a:rPr lang="en-US"/>
               <a:t>Third level</a:t>
             </a:r>
+            <a:endParaRPr lang="en-US"/>
           </a:p>
           <a:p>
             <a:pPr lvl="3"/>
@@ -2150,6 +1921,7 @@
               <a:rPr lang="en-US"/>
               <a:t>Fourth level</a:t>
             </a:r>
+            <a:endParaRPr lang="en-US"/>
           </a:p>
           <a:p>
             <a:pPr lvl="4"/>
@@ -2157,18 +1929,13 @@
               <a:rPr lang="en-US"/>
               <a:t>Fifth level</a:t>
             </a:r>
-          </a:p>
-        </p:txBody>
-      </p:sp>
-      <p:sp>
-        <p:nvSpPr>
-          <p:cNvPr id="7" name="Date Placeholder 6">
-            <a:extLst>
-              <a:ext uri="{FF2B5EF4-FFF2-40B4-BE49-F238E27FC236}">
-                <a16:creationId xmlns:a16="http://schemas.microsoft.com/office/drawing/2014/main" id="{599BF4CB-4B11-6795-84C1-91B139428AEE}"/>
-              </a:ext>
-            </a:extLst>
-          </p:cNvPr>
+            <a:endParaRPr lang="en-US"/>
+          </a:p>
+        </p:txBody>
+      </p:sp>
+      <p:sp>
+        <p:nvSpPr>
+          <p:cNvPr id="7" name="Date Placeholder 6"/>
           <p:cNvSpPr>
             <a:spLocks noGrp="1"/>
           </p:cNvSpPr>
@@ -2183,7 +1950,6 @@
           <a:p>
             <a:fld id="{07D6C43A-13E2-48A2-BAE5-CC73887FC199}" type="datetime1">
               <a:rPr lang="en-US" smtClean="0"/>
-              <a:t>10/27/2025</a:t>
             </a:fld>
             <a:endParaRPr lang="en-US"/>
           </a:p>
@@ -2191,13 +1957,7 @@
       </p:sp>
       <p:sp>
         <p:nvSpPr>
-          <p:cNvPr id="8" name="Footer Placeholder 7">
-            <a:extLst>
-              <a:ext uri="{FF2B5EF4-FFF2-40B4-BE49-F238E27FC236}">
-                <a16:creationId xmlns:a16="http://schemas.microsoft.com/office/drawing/2014/main" id="{F52FCB82-5972-D333-E21C-DF24F6BCF49B}"/>
-              </a:ext>
-            </a:extLst>
-          </p:cNvPr>
+          <p:cNvPr id="8" name="Footer Placeholder 7"/>
           <p:cNvSpPr>
             <a:spLocks noGrp="1"/>
           </p:cNvSpPr>
@@ -2216,13 +1976,7 @@
       </p:sp>
       <p:sp>
         <p:nvSpPr>
-          <p:cNvPr id="9" name="Slide Number Placeholder 8">
-            <a:extLst>
-              <a:ext uri="{FF2B5EF4-FFF2-40B4-BE49-F238E27FC236}">
-                <a16:creationId xmlns:a16="http://schemas.microsoft.com/office/drawing/2014/main" id="{AF12211A-324E-9069-32B0-8F509730AD76}"/>
-              </a:ext>
-            </a:extLst>
-          </p:cNvPr>
+          <p:cNvPr id="9" name="Slide Number Placeholder 8"/>
           <p:cNvSpPr>
             <a:spLocks noGrp="1"/>
           </p:cNvSpPr>
@@ -2237,18 +1991,12 @@
           <a:p>
             <a:fld id="{1FCEF87E-815D-44D1-B0AB-39AF0402D6A8}" type="slidenum">
               <a:rPr lang="en-US" smtClean="0"/>
-              <a:t>‹#›</a:t>
             </a:fld>
             <a:endParaRPr lang="en-US"/>
           </a:p>
         </p:txBody>
       </p:sp>
     </p:spTree>
-    <p:extLst>
-      <p:ext uri="{BB962C8B-B14F-4D97-AF65-F5344CB8AC3E}">
-        <p14:creationId xmlns:p14="http://schemas.microsoft.com/office/powerpoint/2010/main" val="3342088284"/>
-      </p:ext>
-    </p:extLst>
   </p:cSld>
   <p:clrMapOvr>
     <a:masterClrMapping/>
@@ -2275,13 +2023,7 @@
       </p:grpSpPr>
       <p:sp>
         <p:nvSpPr>
-          <p:cNvPr id="2" name="Title 1">
-            <a:extLst>
-              <a:ext uri="{FF2B5EF4-FFF2-40B4-BE49-F238E27FC236}">
-                <a16:creationId xmlns:a16="http://schemas.microsoft.com/office/drawing/2014/main" id="{E040A965-A2B0-80BB-C6BA-CCCFA272AEDC}"/>
-              </a:ext>
-            </a:extLst>
-          </p:cNvPr>
+          <p:cNvPr id="2" name="Title 1"/>
           <p:cNvSpPr>
             <a:spLocks noGrp="1"/>
           </p:cNvSpPr>
@@ -2298,18 +2040,13 @@
               <a:rPr lang="en-US"/>
               <a:t>Click to edit Master title style</a:t>
             </a:r>
-          </a:p>
-        </p:txBody>
-      </p:sp>
-      <p:sp>
-        <p:nvSpPr>
-          <p:cNvPr id="3" name="Date Placeholder 2">
-            <a:extLst>
-              <a:ext uri="{FF2B5EF4-FFF2-40B4-BE49-F238E27FC236}">
-                <a16:creationId xmlns:a16="http://schemas.microsoft.com/office/drawing/2014/main" id="{DF0A2016-FBBB-4A1F-6F9E-FE6A63DE4832}"/>
-              </a:ext>
-            </a:extLst>
-          </p:cNvPr>
+            <a:endParaRPr lang="en-US"/>
+          </a:p>
+        </p:txBody>
+      </p:sp>
+      <p:sp>
+        <p:nvSpPr>
+          <p:cNvPr id="3" name="Date Placeholder 2"/>
           <p:cNvSpPr>
             <a:spLocks noGrp="1"/>
           </p:cNvSpPr>
@@ -2324,7 +2061,6 @@
           <a:p>
             <a:fld id="{4EA2C5D3-416C-4131-8BC9-E71DA97D5A64}" type="datetime1">
               <a:rPr lang="en-US" smtClean="0"/>
-              <a:t>10/27/2025</a:t>
             </a:fld>
             <a:endParaRPr lang="en-US"/>
           </a:p>
@@ -2332,13 +2068,7 @@
       </p:sp>
       <p:sp>
         <p:nvSpPr>
-          <p:cNvPr id="4" name="Footer Placeholder 3">
-            <a:extLst>
-              <a:ext uri="{FF2B5EF4-FFF2-40B4-BE49-F238E27FC236}">
-                <a16:creationId xmlns:a16="http://schemas.microsoft.com/office/drawing/2014/main" id="{EBE845DF-F961-5466-32C3-C6385060CC2A}"/>
-              </a:ext>
-            </a:extLst>
-          </p:cNvPr>
+          <p:cNvPr id="4" name="Footer Placeholder 3"/>
           <p:cNvSpPr>
             <a:spLocks noGrp="1"/>
           </p:cNvSpPr>
@@ -2357,13 +2087,7 @@
       </p:sp>
       <p:sp>
         <p:nvSpPr>
-          <p:cNvPr id="5" name="Slide Number Placeholder 4">
-            <a:extLst>
-              <a:ext uri="{FF2B5EF4-FFF2-40B4-BE49-F238E27FC236}">
-                <a16:creationId xmlns:a16="http://schemas.microsoft.com/office/drawing/2014/main" id="{76E057F6-928A-6D9F-4161-C04DEAA83D65}"/>
-              </a:ext>
-            </a:extLst>
-          </p:cNvPr>
+          <p:cNvPr id="5" name="Slide Number Placeholder 4"/>
           <p:cNvSpPr>
             <a:spLocks noGrp="1"/>
           </p:cNvSpPr>
@@ -2378,18 +2102,12 @@
           <a:p>
             <a:fld id="{1FCEF87E-815D-44D1-B0AB-39AF0402D6A8}" type="slidenum">
               <a:rPr lang="en-US" smtClean="0"/>
-              <a:t>‹#›</a:t>
             </a:fld>
             <a:endParaRPr lang="en-US"/>
           </a:p>
         </p:txBody>
       </p:sp>
     </p:spTree>
-    <p:extLst>
-      <p:ext uri="{BB962C8B-B14F-4D97-AF65-F5344CB8AC3E}">
-        <p14:creationId xmlns:p14="http://schemas.microsoft.com/office/powerpoint/2010/main" val="2075974386"/>
-      </p:ext>
-    </p:extLst>
   </p:cSld>
   <p:clrMapOvr>
     <a:masterClrMapping/>
@@ -2416,13 +2134,7 @@
       </p:grpSpPr>
       <p:sp>
         <p:nvSpPr>
-          <p:cNvPr id="2" name="Date Placeholder 1">
-            <a:extLst>
-              <a:ext uri="{FF2B5EF4-FFF2-40B4-BE49-F238E27FC236}">
-                <a16:creationId xmlns:a16="http://schemas.microsoft.com/office/drawing/2014/main" id="{3DB366D7-6680-4FD6-C029-DC5C0BB2354F}"/>
-              </a:ext>
-            </a:extLst>
-          </p:cNvPr>
+          <p:cNvPr id="2" name="Date Placeholder 1"/>
           <p:cNvSpPr>
             <a:spLocks noGrp="1"/>
           </p:cNvSpPr>
@@ -2437,7 +2149,6 @@
           <a:p>
             <a:fld id="{B8971593-8386-48B7-BB85-87C0949B2086}" type="datetime1">
               <a:rPr lang="en-US" smtClean="0"/>
-              <a:t>10/27/2025</a:t>
             </a:fld>
             <a:endParaRPr lang="en-US"/>
           </a:p>
@@ -2445,13 +2156,7 @@
       </p:sp>
       <p:sp>
         <p:nvSpPr>
-          <p:cNvPr id="3" name="Footer Placeholder 2">
-            <a:extLst>
-              <a:ext uri="{FF2B5EF4-FFF2-40B4-BE49-F238E27FC236}">
-                <a16:creationId xmlns:a16="http://schemas.microsoft.com/office/drawing/2014/main" id="{94179984-8567-91CB-0310-29A3752B78B3}"/>
-              </a:ext>
-            </a:extLst>
-          </p:cNvPr>
+          <p:cNvPr id="3" name="Footer Placeholder 2"/>
           <p:cNvSpPr>
             <a:spLocks noGrp="1"/>
           </p:cNvSpPr>
@@ -2470,13 +2175,7 @@
       </p:sp>
       <p:sp>
         <p:nvSpPr>
-          <p:cNvPr id="4" name="Slide Number Placeholder 3">
-            <a:extLst>
-              <a:ext uri="{FF2B5EF4-FFF2-40B4-BE49-F238E27FC236}">
-                <a16:creationId xmlns:a16="http://schemas.microsoft.com/office/drawing/2014/main" id="{A22C7A0D-606C-3BF9-8DBE-908D80966AD1}"/>
-              </a:ext>
-            </a:extLst>
-          </p:cNvPr>
+          <p:cNvPr id="4" name="Slide Number Placeholder 3"/>
           <p:cNvSpPr>
             <a:spLocks noGrp="1"/>
           </p:cNvSpPr>
@@ -2491,18 +2190,12 @@
           <a:p>
             <a:fld id="{1FCEF87E-815D-44D1-B0AB-39AF0402D6A8}" type="slidenum">
               <a:rPr lang="en-US" smtClean="0"/>
-              <a:t>‹#›</a:t>
             </a:fld>
             <a:endParaRPr lang="en-US"/>
           </a:p>
         </p:txBody>
       </p:sp>
     </p:spTree>
-    <p:extLst>
-      <p:ext uri="{BB962C8B-B14F-4D97-AF65-F5344CB8AC3E}">
-        <p14:creationId xmlns:p14="http://schemas.microsoft.com/office/powerpoint/2010/main" val="2799376281"/>
-      </p:ext>
-    </p:extLst>
   </p:cSld>
   <p:clrMapOvr>
     <a:masterClrMapping/>
@@ -2529,13 +2222,7 @@
       </p:grpSpPr>
       <p:sp>
         <p:nvSpPr>
-          <p:cNvPr id="2" name="Title 1">
-            <a:extLst>
-              <a:ext uri="{FF2B5EF4-FFF2-40B4-BE49-F238E27FC236}">
-                <a16:creationId xmlns:a16="http://schemas.microsoft.com/office/drawing/2014/main" id="{13C684C1-8596-31A1-180D-C7EC5332BBD7}"/>
-              </a:ext>
-            </a:extLst>
-          </p:cNvPr>
+          <p:cNvPr id="2" name="Title 1"/>
           <p:cNvSpPr>
             <a:spLocks noGrp="1"/>
           </p:cNvSpPr>
@@ -2561,18 +2248,13 @@
               <a:rPr lang="en-US"/>
               <a:t>Click to edit Master title style</a:t>
             </a:r>
-          </a:p>
-        </p:txBody>
-      </p:sp>
-      <p:sp>
-        <p:nvSpPr>
-          <p:cNvPr id="3" name="Content Placeholder 2">
-            <a:extLst>
-              <a:ext uri="{FF2B5EF4-FFF2-40B4-BE49-F238E27FC236}">
-                <a16:creationId xmlns:a16="http://schemas.microsoft.com/office/drawing/2014/main" id="{713762C2-B7CC-ADA3-9D39-3541B3FE5A3F}"/>
-              </a:ext>
-            </a:extLst>
-          </p:cNvPr>
+            <a:endParaRPr lang="en-US"/>
+          </a:p>
+        </p:txBody>
+      </p:sp>
+      <p:sp>
+        <p:nvSpPr>
+          <p:cNvPr id="3" name="Content Placeholder 2"/>
           <p:cNvSpPr>
             <a:spLocks noGrp="1"/>
           </p:cNvSpPr>
@@ -2623,6 +2305,7 @@
               <a:rPr lang="en-US"/>
               <a:t>Click to edit Master text styles</a:t>
             </a:r>
+            <a:endParaRPr lang="en-US"/>
           </a:p>
           <a:p>
             <a:pPr lvl="1"/>
@@ -2630,6 +2313,7 @@
               <a:rPr lang="en-US"/>
               <a:t>Second level</a:t>
             </a:r>
+            <a:endParaRPr lang="en-US"/>
           </a:p>
           <a:p>
             <a:pPr lvl="2"/>
@@ -2637,6 +2321,7 @@
               <a:rPr lang="en-US"/>
               <a:t>Third level</a:t>
             </a:r>
+            <a:endParaRPr lang="en-US"/>
           </a:p>
           <a:p>
             <a:pPr lvl="3"/>
@@ -2644,6 +2329,7 @@
               <a:rPr lang="en-US"/>
               <a:t>Fourth level</a:t>
             </a:r>
+            <a:endParaRPr lang="en-US"/>
           </a:p>
           <a:p>
             <a:pPr lvl="4"/>
@@ -2651,18 +2337,13 @@
               <a:rPr lang="en-US"/>
               <a:t>Fifth level</a:t>
             </a:r>
-          </a:p>
-        </p:txBody>
-      </p:sp>
-      <p:sp>
-        <p:nvSpPr>
-          <p:cNvPr id="4" name="Text Placeholder 3">
-            <a:extLst>
-              <a:ext uri="{FF2B5EF4-FFF2-40B4-BE49-F238E27FC236}">
-                <a16:creationId xmlns:a16="http://schemas.microsoft.com/office/drawing/2014/main" id="{6835A5F9-7E68-401F-C3BB-09FB74F827C4}"/>
-              </a:ext>
-            </a:extLst>
-          </p:cNvPr>
+            <a:endParaRPr lang="en-US"/>
+          </a:p>
+        </p:txBody>
+      </p:sp>
+      <p:sp>
+        <p:nvSpPr>
+          <p:cNvPr id="4" name="Text Placeholder 3"/>
           <p:cNvSpPr>
             <a:spLocks noGrp="1"/>
           </p:cNvSpPr>
@@ -2722,18 +2403,13 @@
               <a:rPr lang="en-US"/>
               <a:t>Click to edit Master text styles</a:t>
             </a:r>
-          </a:p>
-        </p:txBody>
-      </p:sp>
-      <p:sp>
-        <p:nvSpPr>
-          <p:cNvPr id="5" name="Date Placeholder 4">
-            <a:extLst>
-              <a:ext uri="{FF2B5EF4-FFF2-40B4-BE49-F238E27FC236}">
-                <a16:creationId xmlns:a16="http://schemas.microsoft.com/office/drawing/2014/main" id="{2A5F73E6-ECB8-2943-41D8-05812D848AD3}"/>
-              </a:ext>
-            </a:extLst>
-          </p:cNvPr>
+            <a:endParaRPr lang="en-US"/>
+          </a:p>
+        </p:txBody>
+      </p:sp>
+      <p:sp>
+        <p:nvSpPr>
+          <p:cNvPr id="5" name="Date Placeholder 4"/>
           <p:cNvSpPr>
             <a:spLocks noGrp="1"/>
           </p:cNvSpPr>
@@ -2748,7 +2424,6 @@
           <a:p>
             <a:fld id="{3070F398-88D3-4D2F-9F7E-785BF8AD0274}" type="datetime1">
               <a:rPr lang="en-US" smtClean="0"/>
-              <a:t>10/27/2025</a:t>
             </a:fld>
             <a:endParaRPr lang="en-US"/>
           </a:p>
@@ -2756,13 +2431,7 @@
       </p:sp>
       <p:sp>
         <p:nvSpPr>
-          <p:cNvPr id="6" name="Footer Placeholder 5">
-            <a:extLst>
-              <a:ext uri="{FF2B5EF4-FFF2-40B4-BE49-F238E27FC236}">
-                <a16:creationId xmlns:a16="http://schemas.microsoft.com/office/drawing/2014/main" id="{D86B5AF7-95CA-05D2-1119-F667C7B6F8DB}"/>
-              </a:ext>
-            </a:extLst>
-          </p:cNvPr>
+          <p:cNvPr id="6" name="Footer Placeholder 5"/>
           <p:cNvSpPr>
             <a:spLocks noGrp="1"/>
           </p:cNvSpPr>
@@ -2781,13 +2450,7 @@
       </p:sp>
       <p:sp>
         <p:nvSpPr>
-          <p:cNvPr id="7" name="Slide Number Placeholder 6">
-            <a:extLst>
-              <a:ext uri="{FF2B5EF4-FFF2-40B4-BE49-F238E27FC236}">
-                <a16:creationId xmlns:a16="http://schemas.microsoft.com/office/drawing/2014/main" id="{22599C23-C916-AE53-9371-42CF3819D0E1}"/>
-              </a:ext>
-            </a:extLst>
-          </p:cNvPr>
+          <p:cNvPr id="7" name="Slide Number Placeholder 6"/>
           <p:cNvSpPr>
             <a:spLocks noGrp="1"/>
           </p:cNvSpPr>
@@ -2802,18 +2465,12 @@
           <a:p>
             <a:fld id="{1FCEF87E-815D-44D1-B0AB-39AF0402D6A8}" type="slidenum">
               <a:rPr lang="en-US" smtClean="0"/>
-              <a:t>‹#›</a:t>
             </a:fld>
             <a:endParaRPr lang="en-US"/>
           </a:p>
         </p:txBody>
       </p:sp>
     </p:spTree>
-    <p:extLst>
-      <p:ext uri="{BB962C8B-B14F-4D97-AF65-F5344CB8AC3E}">
-        <p14:creationId xmlns:p14="http://schemas.microsoft.com/office/powerpoint/2010/main" val="1574991301"/>
-      </p:ext>
-    </p:extLst>
   </p:cSld>
   <p:clrMapOvr>
     <a:masterClrMapping/>
@@ -2840,13 +2497,7 @@
       </p:grpSpPr>
       <p:sp>
         <p:nvSpPr>
-          <p:cNvPr id="2" name="Title 1">
-            <a:extLst>
-              <a:ext uri="{FF2B5EF4-FFF2-40B4-BE49-F238E27FC236}">
-                <a16:creationId xmlns:a16="http://schemas.microsoft.com/office/drawing/2014/main" id="{52B9AC56-39A4-2278-722C-617F9F770A48}"/>
-              </a:ext>
-            </a:extLst>
-          </p:cNvPr>
+          <p:cNvPr id="2" name="Title 1"/>
           <p:cNvSpPr>
             <a:spLocks noGrp="1"/>
           </p:cNvSpPr>
@@ -2872,18 +2523,13 @@
               <a:rPr lang="en-US"/>
               <a:t>Click to edit Master title style</a:t>
             </a:r>
-          </a:p>
-        </p:txBody>
-      </p:sp>
-      <p:sp>
-        <p:nvSpPr>
-          <p:cNvPr id="3" name="Picture Placeholder 2">
-            <a:extLst>
-              <a:ext uri="{FF2B5EF4-FFF2-40B4-BE49-F238E27FC236}">
-                <a16:creationId xmlns:a16="http://schemas.microsoft.com/office/drawing/2014/main" id="{B1FAD1B2-1942-74FB-C400-0DB0C13B90D9}"/>
-              </a:ext>
-            </a:extLst>
-          </p:cNvPr>
+            <a:endParaRPr lang="en-US"/>
+          </a:p>
+        </p:txBody>
+      </p:sp>
+      <p:sp>
+        <p:nvSpPr>
+          <p:cNvPr id="3" name="Picture Placeholder 2"/>
           <p:cNvSpPr>
             <a:spLocks noGrp="1"/>
           </p:cNvSpPr>
@@ -2944,13 +2590,7 @@
       </p:sp>
       <p:sp>
         <p:nvSpPr>
-          <p:cNvPr id="4" name="Text Placeholder 3">
-            <a:extLst>
-              <a:ext uri="{FF2B5EF4-FFF2-40B4-BE49-F238E27FC236}">
-                <a16:creationId xmlns:a16="http://schemas.microsoft.com/office/drawing/2014/main" id="{B1DA8F38-E9BE-47E4-7662-3CD4AECCB2BF}"/>
-              </a:ext>
-            </a:extLst>
-          </p:cNvPr>
+          <p:cNvPr id="4" name="Text Placeholder 3"/>
           <p:cNvSpPr>
             <a:spLocks noGrp="1"/>
           </p:cNvSpPr>
@@ -3010,18 +2650,13 @@
               <a:rPr lang="en-US"/>
               <a:t>Click to edit Master text styles</a:t>
             </a:r>
-          </a:p>
-        </p:txBody>
-      </p:sp>
-      <p:sp>
-        <p:nvSpPr>
-          <p:cNvPr id="5" name="Date Placeholder 4">
-            <a:extLst>
-              <a:ext uri="{FF2B5EF4-FFF2-40B4-BE49-F238E27FC236}">
-                <a16:creationId xmlns:a16="http://schemas.microsoft.com/office/drawing/2014/main" id="{A228AE0B-2CCA-EDA3-1B80-8F2E1DF84CA6}"/>
-              </a:ext>
-            </a:extLst>
-          </p:cNvPr>
+            <a:endParaRPr lang="en-US"/>
+          </a:p>
+        </p:txBody>
+      </p:sp>
+      <p:sp>
+        <p:nvSpPr>
+          <p:cNvPr id="5" name="Date Placeholder 4"/>
           <p:cNvSpPr>
             <a:spLocks noGrp="1"/>
           </p:cNvSpPr>
@@ -3036,7 +2671,6 @@
           <a:p>
             <a:fld id="{CE1A94C1-07AC-4775-8A4F-70BB05306BF7}" type="datetime1">
               <a:rPr lang="en-US" smtClean="0"/>
-              <a:t>10/27/2025</a:t>
             </a:fld>
             <a:endParaRPr lang="en-US"/>
           </a:p>
@@ -3044,13 +2678,7 @@
       </p:sp>
       <p:sp>
         <p:nvSpPr>
-          <p:cNvPr id="6" name="Footer Placeholder 5">
-            <a:extLst>
-              <a:ext uri="{FF2B5EF4-FFF2-40B4-BE49-F238E27FC236}">
-                <a16:creationId xmlns:a16="http://schemas.microsoft.com/office/drawing/2014/main" id="{2FDB1342-9AFD-57F0-2E90-76ECCEAFA3F9}"/>
-              </a:ext>
-            </a:extLst>
-          </p:cNvPr>
+          <p:cNvPr id="6" name="Footer Placeholder 5"/>
           <p:cNvSpPr>
             <a:spLocks noGrp="1"/>
           </p:cNvSpPr>
@@ -3069,13 +2697,7 @@
       </p:sp>
       <p:sp>
         <p:nvSpPr>
-          <p:cNvPr id="7" name="Slide Number Placeholder 6">
-            <a:extLst>
-              <a:ext uri="{FF2B5EF4-FFF2-40B4-BE49-F238E27FC236}">
-                <a16:creationId xmlns:a16="http://schemas.microsoft.com/office/drawing/2014/main" id="{6DE180B8-E20A-6138-1A1C-1E980CAD40A5}"/>
-              </a:ext>
-            </a:extLst>
-          </p:cNvPr>
+          <p:cNvPr id="7" name="Slide Number Placeholder 6"/>
           <p:cNvSpPr>
             <a:spLocks noGrp="1"/>
           </p:cNvSpPr>
@@ -3090,18 +2712,12 @@
           <a:p>
             <a:fld id="{1FCEF87E-815D-44D1-B0AB-39AF0402D6A8}" type="slidenum">
               <a:rPr lang="en-US" smtClean="0"/>
-              <a:t>‹#›</a:t>
             </a:fld>
             <a:endParaRPr lang="en-US"/>
           </a:p>
         </p:txBody>
       </p:sp>
     </p:spTree>
-    <p:extLst>
-      <p:ext uri="{BB962C8B-B14F-4D97-AF65-F5344CB8AC3E}">
-        <p14:creationId xmlns:p14="http://schemas.microsoft.com/office/powerpoint/2010/main" val="2969494220"/>
-      </p:ext>
-    </p:extLst>
   </p:cSld>
   <p:clrMapOvr>
     <a:masterClrMapping/>
@@ -3133,13 +2749,7 @@
       </p:grpSpPr>
       <p:sp>
         <p:nvSpPr>
-          <p:cNvPr id="2" name="Title Placeholder 1">
-            <a:extLst>
-              <a:ext uri="{FF2B5EF4-FFF2-40B4-BE49-F238E27FC236}">
-                <a16:creationId xmlns:a16="http://schemas.microsoft.com/office/drawing/2014/main" id="{B34DB59C-E06D-9064-D0E9-EE878347C888}"/>
-              </a:ext>
-            </a:extLst>
-          </p:cNvPr>
+          <p:cNvPr id="2" name="Title Placeholder 1"/>
           <p:cNvSpPr>
             <a:spLocks noGrp="1"/>
           </p:cNvSpPr>
@@ -3166,18 +2776,13 @@
               <a:rPr lang="en-US"/>
               <a:t>Click to edit Master title style</a:t>
             </a:r>
-          </a:p>
-        </p:txBody>
-      </p:sp>
-      <p:sp>
-        <p:nvSpPr>
-          <p:cNvPr id="3" name="Text Placeholder 2">
-            <a:extLst>
-              <a:ext uri="{FF2B5EF4-FFF2-40B4-BE49-F238E27FC236}">
-                <a16:creationId xmlns:a16="http://schemas.microsoft.com/office/drawing/2014/main" id="{003B2644-B987-EA40-64D1-C253A45B0A11}"/>
-              </a:ext>
-            </a:extLst>
-          </p:cNvPr>
+            <a:endParaRPr lang="en-US"/>
+          </a:p>
+        </p:txBody>
+      </p:sp>
+      <p:sp>
+        <p:nvSpPr>
+          <p:cNvPr id="3" name="Text Placeholder 2"/>
           <p:cNvSpPr>
             <a:spLocks noGrp="1"/>
           </p:cNvSpPr>
@@ -3205,6 +2810,7 @@
               <a:rPr lang="en-US"/>
               <a:t>Click to edit Master text styles</a:t>
             </a:r>
+            <a:endParaRPr lang="en-US"/>
           </a:p>
           <a:p>
             <a:pPr lvl="1"/>
@@ -3212,6 +2818,7 @@
               <a:rPr lang="en-US"/>
               <a:t>Second level</a:t>
             </a:r>
+            <a:endParaRPr lang="en-US"/>
           </a:p>
           <a:p>
             <a:pPr lvl="2"/>
@@ -3219,6 +2826,7 @@
               <a:rPr lang="en-US"/>
               <a:t>Third level</a:t>
             </a:r>
+            <a:endParaRPr lang="en-US"/>
           </a:p>
           <a:p>
             <a:pPr lvl="3"/>
@@ -3226,6 +2834,7 @@
               <a:rPr lang="en-US"/>
               <a:t>Fourth level</a:t>
             </a:r>
+            <a:endParaRPr lang="en-US"/>
           </a:p>
           <a:p>
             <a:pPr lvl="4"/>
@@ -3233,18 +2842,13 @@
               <a:rPr lang="en-US"/>
               <a:t>Fifth level</a:t>
             </a:r>
-          </a:p>
-        </p:txBody>
-      </p:sp>
-      <p:sp>
-        <p:nvSpPr>
-          <p:cNvPr id="4" name="Date Placeholder 3">
-            <a:extLst>
-              <a:ext uri="{FF2B5EF4-FFF2-40B4-BE49-F238E27FC236}">
-                <a16:creationId xmlns:a16="http://schemas.microsoft.com/office/drawing/2014/main" id="{6DBC9483-BDE6-AF2E-5EF6-5FD8C63DA85B}"/>
-              </a:ext>
-            </a:extLst>
-          </p:cNvPr>
+            <a:endParaRPr lang="en-US"/>
+          </a:p>
+        </p:txBody>
+      </p:sp>
+      <p:sp>
+        <p:nvSpPr>
+          <p:cNvPr id="4" name="Date Placeholder 3"/>
           <p:cNvSpPr>
             <a:spLocks noGrp="1"/>
           </p:cNvSpPr>
@@ -3277,7 +2881,6 @@
           <a:p>
             <a:fld id="{A7FA37CB-3111-4E43-978B-840B0C3E984E}" type="datetime1">
               <a:rPr lang="en-US" smtClean="0"/>
-              <a:t>10/27/2025</a:t>
             </a:fld>
             <a:endParaRPr lang="en-US"/>
           </a:p>
@@ -3285,13 +2888,7 @@
       </p:sp>
       <p:sp>
         <p:nvSpPr>
-          <p:cNvPr id="5" name="Footer Placeholder 4">
-            <a:extLst>
-              <a:ext uri="{FF2B5EF4-FFF2-40B4-BE49-F238E27FC236}">
-                <a16:creationId xmlns:a16="http://schemas.microsoft.com/office/drawing/2014/main" id="{E6345DA1-9E37-8BE4-5FD8-308623973635}"/>
-              </a:ext>
-            </a:extLst>
-          </p:cNvPr>
+          <p:cNvPr id="5" name="Footer Placeholder 4"/>
           <p:cNvSpPr>
             <a:spLocks noGrp="1"/>
           </p:cNvSpPr>
@@ -3328,13 +2925,7 @@
       </p:sp>
       <p:sp>
         <p:nvSpPr>
-          <p:cNvPr id="6" name="Slide Number Placeholder 5">
-            <a:extLst>
-              <a:ext uri="{FF2B5EF4-FFF2-40B4-BE49-F238E27FC236}">
-                <a16:creationId xmlns:a16="http://schemas.microsoft.com/office/drawing/2014/main" id="{89C78D0E-8A6B-A368-9312-1F3C29DDBA8C}"/>
-              </a:ext>
-            </a:extLst>
-          </p:cNvPr>
+          <p:cNvPr id="6" name="Slide Number Placeholder 5"/>
           <p:cNvSpPr>
             <a:spLocks noGrp="1"/>
           </p:cNvSpPr>
@@ -3367,18 +2958,12 @@
           <a:p>
             <a:fld id="{1FCEF87E-815D-44D1-B0AB-39AF0402D6A8}" type="slidenum">
               <a:rPr lang="en-US" smtClean="0"/>
-              <a:t>‹#›</a:t>
             </a:fld>
             <a:endParaRPr lang="en-US"/>
           </a:p>
         </p:txBody>
       </p:sp>
     </p:spTree>
-    <p:extLst>
-      <p:ext uri="{BB962C8B-B14F-4D97-AF65-F5344CB8AC3E}">
-        <p14:creationId xmlns:p14="http://schemas.microsoft.com/office/powerpoint/2010/main" val="3696527194"/>
-      </p:ext>
-    </p:extLst>
   </p:cSld>
   <p:clrMap bg1="lt1" tx1="dk1" bg2="lt2" tx2="dk2" accent1="accent1" accent2="accent2" accent3="accent3" accent4="accent4" accent5="accent5" accent6="accent6" hlink="hlink" folHlink="folHlink"/>
   <p:sldLayoutIdLst>
@@ -3697,18 +3282,12 @@
       </p:grpSpPr>
       <p:pic>
         <p:nvPicPr>
-          <p:cNvPr id="4" name="Picture 3">
-            <a:extLst>
-              <a:ext uri="{FF2B5EF4-FFF2-40B4-BE49-F238E27FC236}">
-                <a16:creationId xmlns:a16="http://schemas.microsoft.com/office/drawing/2014/main" id="{77F15FA6-086D-491A-B175-0CA4656FBDCB}"/>
-              </a:ext>
-            </a:extLst>
-          </p:cNvPr>
+          <p:cNvPr id="4" name="Picture 3"/>
           <p:cNvPicPr/>
           <p:nvPr/>
         </p:nvPicPr>
         <p:blipFill>
-          <a:blip r:embed="rId2" cstate="print"/>
+          <a:blip r:embed="rId1" cstate="print"/>
           <a:srcRect l="21229" t="27213" r="21523" b="35253"/>
           <a:stretch>
             <a:fillRect/>
@@ -3723,7 +3302,6 @@
             <a:avLst/>
           </a:prstGeom>
           <a:ln>
-            <a:headEnd/>
             <a:tailEnd type="none" w="med" len="med"/>
           </a:ln>
         </p:spPr>
@@ -3744,13 +3322,7 @@
       </p:pic>
       <p:sp>
         <p:nvSpPr>
-          <p:cNvPr id="7" name="Title 6">
-            <a:extLst>
-              <a:ext uri="{FF2B5EF4-FFF2-40B4-BE49-F238E27FC236}">
-                <a16:creationId xmlns:a16="http://schemas.microsoft.com/office/drawing/2014/main" id="{5BEE647A-5606-A6E5-93DB-A43A8FC2D88A}"/>
-              </a:ext>
-            </a:extLst>
-          </p:cNvPr>
+          <p:cNvPr id="7" name="Title 6"/>
           <p:cNvSpPr>
             <a:spLocks noGrp="1"/>
           </p:cNvSpPr>
@@ -3896,23 +3468,11 @@
       </p:sp>
       <p:graphicFrame>
         <p:nvGraphicFramePr>
-          <p:cNvPr id="11" name="Table 10">
-            <a:extLst>
-              <a:ext uri="{FF2B5EF4-FFF2-40B4-BE49-F238E27FC236}">
-                <a16:creationId xmlns:a16="http://schemas.microsoft.com/office/drawing/2014/main" id="{B39E0012-B3AF-E718-6BBA-5D37629E4005}"/>
-              </a:ext>
-            </a:extLst>
-          </p:cNvPr>
+          <p:cNvPr id="11" name="Table 10"/>
           <p:cNvGraphicFramePr>
             <a:graphicFrameLocks noGrp="1"/>
           </p:cNvGraphicFramePr>
-          <p:nvPr>
-            <p:extLst>
-              <p:ext uri="{D42A27DB-BD31-4B8C-83A1-F6EECF244321}">
-                <p14:modId xmlns:p14="http://schemas.microsoft.com/office/powerpoint/2010/main" val="3446836232"/>
-              </p:ext>
-            </p:extLst>
-          </p:nvPr>
+          <p:nvPr/>
         </p:nvGraphicFramePr>
         <p:xfrm>
           <a:off x="2098841" y="3845961"/>
@@ -3925,20 +3485,8 @@
                 <a:tableStyleId>{21E4AEA4-8DFA-4A89-87EB-49C32662AFE0}</a:tableStyleId>
               </a:tblPr>
               <a:tblGrid>
-                <a:gridCol w="2216485">
-                  <a:extLst>
-                    <a:ext uri="{9D8B030D-6E8A-4147-A177-3AD203B41FA5}">
-                      <a16:colId xmlns:a16="http://schemas.microsoft.com/office/drawing/2014/main" val="1924387309"/>
-                    </a:ext>
-                  </a:extLst>
-                </a:gridCol>
-                <a:gridCol w="6176211">
-                  <a:extLst>
-                    <a:ext uri="{9D8B030D-6E8A-4147-A177-3AD203B41FA5}">
-                      <a16:colId xmlns:a16="http://schemas.microsoft.com/office/drawing/2014/main" val="471423325"/>
-                    </a:ext>
-                  </a:extLst>
-                </a:gridCol>
+                <a:gridCol w="2216485"/>
+                <a:gridCol w="6176211"/>
               </a:tblGrid>
               <a:tr h="486314">
                 <a:tc>
@@ -3972,15 +3520,11 @@
                         <a:rPr lang="en-US" dirty="0"/>
                         <a:t>2117240030054</a:t>
                       </a:r>
+                      <a:endParaRPr lang="en-US" dirty="0"/>
                     </a:p>
                   </a:txBody>
                   <a:tcPr/>
                 </a:tc>
-                <a:extLst>
-                  <a:ext uri="{0D108BD9-81ED-4DB2-BD59-A6C34878D82A}">
-                    <a16:rowId xmlns:a16="http://schemas.microsoft.com/office/drawing/2014/main" val="471703413"/>
-                  </a:ext>
-                </a:extLst>
               </a:tr>
               <a:tr h="493068">
                 <a:tc>
@@ -4014,15 +3558,11 @@
                         <a:rPr lang="en-US" dirty="0"/>
                         <a:t>JEEVA M</a:t>
                       </a:r>
+                      <a:endParaRPr lang="en-US" dirty="0"/>
                     </a:p>
                   </a:txBody>
                   <a:tcPr/>
                 </a:tc>
-                <a:extLst>
-                  <a:ext uri="{0D108BD9-81ED-4DB2-BD59-A6C34878D82A}">
-                    <a16:rowId xmlns:a16="http://schemas.microsoft.com/office/drawing/2014/main" val="2967366592"/>
-                  </a:ext>
-                </a:extLst>
               </a:tr>
               <a:tr h="493068">
                 <a:tc>
@@ -4064,15 +3604,11 @@
                         <a:rPr lang="en-US" dirty="0"/>
                         <a:t> YEAR</a:t>
                       </a:r>
+                      <a:endParaRPr lang="en-US" dirty="0"/>
                     </a:p>
                   </a:txBody>
                   <a:tcPr/>
                 </a:tc>
-                <a:extLst>
-                  <a:ext uri="{0D108BD9-81ED-4DB2-BD59-A6C34878D82A}">
-                    <a16:rowId xmlns:a16="http://schemas.microsoft.com/office/drawing/2014/main" val="3106965190"/>
-                  </a:ext>
-                </a:extLst>
               </a:tr>
               <a:tr h="493068">
                 <a:tc>
@@ -4106,15 +3642,11 @@
                         <a:rPr lang="en-US" dirty="0"/>
                         <a:t>A</a:t>
                       </a:r>
+                      <a:endParaRPr lang="en-US" dirty="0"/>
                     </a:p>
                   </a:txBody>
                   <a:tcPr/>
                 </a:tc>
-                <a:extLst>
-                  <a:ext uri="{0D108BD9-81ED-4DB2-BD59-A6C34878D82A}">
-                    <a16:rowId xmlns:a16="http://schemas.microsoft.com/office/drawing/2014/main" val="3234068443"/>
-                  </a:ext>
-                </a:extLst>
               </a:tr>
               <a:tr h="493068">
                 <a:tc>
@@ -4153,11 +3685,6 @@
                   </a:txBody>
                   <a:tcPr/>
                 </a:tc>
-                <a:extLst>
-                  <a:ext uri="{0D108BD9-81ED-4DB2-BD59-A6C34878D82A}">
-                    <a16:rowId xmlns:a16="http://schemas.microsoft.com/office/drawing/2014/main" val="3536199969"/>
-                  </a:ext>
-                </a:extLst>
               </a:tr>
             </a:tbl>
           </a:graphicData>
@@ -4165,13 +3692,7 @@
       </p:graphicFrame>
       <p:sp>
         <p:nvSpPr>
-          <p:cNvPr id="12" name="Date Placeholder 11">
-            <a:extLst>
-              <a:ext uri="{FF2B5EF4-FFF2-40B4-BE49-F238E27FC236}">
-                <a16:creationId xmlns:a16="http://schemas.microsoft.com/office/drawing/2014/main" id="{6B174A57-15CE-2FFD-86D9-B7E84692480D}"/>
-              </a:ext>
-            </a:extLst>
-          </p:cNvPr>
+          <p:cNvPr id="12" name="Date Placeholder 11"/>
           <p:cNvSpPr>
             <a:spLocks noGrp="1"/>
           </p:cNvSpPr>
@@ -4186,7 +3707,6 @@
           <a:p>
             <a:fld id="{F9B0B098-7844-408D-9BB3-6B083FBEE8AA}" type="datetime1">
               <a:rPr lang="en-US" smtClean="0"/>
-              <a:t>10/27/2025</a:t>
             </a:fld>
             <a:endParaRPr lang="en-US"/>
           </a:p>
@@ -4194,13 +3714,7 @@
       </p:sp>
       <p:sp>
         <p:nvSpPr>
-          <p:cNvPr id="13" name="Slide Number Placeholder 12">
-            <a:extLst>
-              <a:ext uri="{FF2B5EF4-FFF2-40B4-BE49-F238E27FC236}">
-                <a16:creationId xmlns:a16="http://schemas.microsoft.com/office/drawing/2014/main" id="{E4873981-939E-932D-DBE2-6B02CC92B85F}"/>
-              </a:ext>
-            </a:extLst>
-          </p:cNvPr>
+          <p:cNvPr id="13" name="Slide Number Placeholder 12"/>
           <p:cNvSpPr>
             <a:spLocks noGrp="1"/>
           </p:cNvSpPr>
@@ -4215,18 +3729,12 @@
           <a:p>
             <a:fld id="{1FCEF87E-815D-44D1-B0AB-39AF0402D6A8}" type="slidenum">
               <a:rPr lang="en-US" smtClean="0"/>
-              <a:t>1</a:t>
             </a:fld>
             <a:endParaRPr lang="en-US"/>
           </a:p>
         </p:txBody>
       </p:sp>
     </p:spTree>
-    <p:extLst>
-      <p:ext uri="{BB962C8B-B14F-4D97-AF65-F5344CB8AC3E}">
-        <p14:creationId xmlns:p14="http://schemas.microsoft.com/office/powerpoint/2010/main" val="2720793846"/>
-      </p:ext>
-    </p:extLst>
   </p:cSld>
   <p:clrMapOvr>
     <a:masterClrMapping/>
@@ -4253,13 +3761,7 @@
       </p:grpSpPr>
       <p:sp>
         <p:nvSpPr>
-          <p:cNvPr id="2" name="Title 1">
-            <a:extLst>
-              <a:ext uri="{FF2B5EF4-FFF2-40B4-BE49-F238E27FC236}">
-                <a16:creationId xmlns:a16="http://schemas.microsoft.com/office/drawing/2014/main" id="{723E759A-0732-65F8-ABFC-93E81441B8A8}"/>
-              </a:ext>
-            </a:extLst>
-          </p:cNvPr>
+          <p:cNvPr id="2" name="Title 1"/>
           <p:cNvSpPr>
             <a:spLocks noGrp="1"/>
           </p:cNvSpPr>
@@ -4312,13 +3814,7 @@
       </p:sp>
       <p:sp>
         <p:nvSpPr>
-          <p:cNvPr id="3" name="Content Placeholder 2">
-            <a:extLst>
-              <a:ext uri="{FF2B5EF4-FFF2-40B4-BE49-F238E27FC236}">
-                <a16:creationId xmlns:a16="http://schemas.microsoft.com/office/drawing/2014/main" id="{FAE17474-C476-1051-3F37-A2159E2BEE57}"/>
-              </a:ext>
-            </a:extLst>
-          </p:cNvPr>
+          <p:cNvPr id="3" name="Content Placeholder 2"/>
           <p:cNvSpPr>
             <a:spLocks noGrp="1"/>
           </p:cNvSpPr>
@@ -4348,6 +3844,7 @@
               <a:rPr lang="en-US" sz="2400" dirty="0"/>
               <a:t> enables computers to solve problems, recognize patterns, and adapt from experience.AI concepts include machine learning, reasoning, and natural language processing.</a:t>
             </a:r>
+            <a:endParaRPr lang="en-US" sz="2400" dirty="0"/>
           </a:p>
           <a:p>
             <a:pPr lvl="0"/>
@@ -4385,6 +3882,7 @@
               <a:rPr lang="en-US" sz="2400" dirty="0"/>
               <a:t>The project showcases how AI reasoning and decision-making can be used to solve simple interactive problems.</a:t>
             </a:r>
+            <a:endParaRPr lang="en-US" sz="2400" dirty="0"/>
           </a:p>
           <a:p>
             <a:pPr lvl="0"/>
@@ -4420,13 +3918,7 @@
       </p:sp>
       <p:sp>
         <p:nvSpPr>
-          <p:cNvPr id="4" name="Date Placeholder 3">
-            <a:extLst>
-              <a:ext uri="{FF2B5EF4-FFF2-40B4-BE49-F238E27FC236}">
-                <a16:creationId xmlns:a16="http://schemas.microsoft.com/office/drawing/2014/main" id="{85FF5BCC-B36E-DFE5-103F-31FA12632094}"/>
-              </a:ext>
-            </a:extLst>
-          </p:cNvPr>
+          <p:cNvPr id="4" name="Date Placeholder 3"/>
           <p:cNvSpPr>
             <a:spLocks noGrp="1"/>
           </p:cNvSpPr>
@@ -4441,7 +3933,6 @@
           <a:p>
             <a:fld id="{316FBEDF-053F-468F-8CCF-D1ACE4FBB50D}" type="datetime1">
               <a:rPr lang="en-US" smtClean="0"/>
-              <a:t>10/27/2025</a:t>
             </a:fld>
             <a:endParaRPr lang="en-US"/>
           </a:p>
@@ -4449,13 +3940,7 @@
       </p:sp>
       <p:sp>
         <p:nvSpPr>
-          <p:cNvPr id="5" name="Slide Number Placeholder 4">
-            <a:extLst>
-              <a:ext uri="{FF2B5EF4-FFF2-40B4-BE49-F238E27FC236}">
-                <a16:creationId xmlns:a16="http://schemas.microsoft.com/office/drawing/2014/main" id="{70253399-F526-B4B1-D444-32B3A164A39F}"/>
-              </a:ext>
-            </a:extLst>
-          </p:cNvPr>
+          <p:cNvPr id="5" name="Slide Number Placeholder 4"/>
           <p:cNvSpPr>
             <a:spLocks noGrp="1"/>
           </p:cNvSpPr>
@@ -4470,18 +3955,12 @@
           <a:p>
             <a:fld id="{1FCEF87E-815D-44D1-B0AB-39AF0402D6A8}" type="slidenum">
               <a:rPr lang="en-US" smtClean="0"/>
-              <a:t>2</a:t>
             </a:fld>
             <a:endParaRPr lang="en-US"/>
           </a:p>
         </p:txBody>
       </p:sp>
     </p:spTree>
-    <p:extLst>
-      <p:ext uri="{BB962C8B-B14F-4D97-AF65-F5344CB8AC3E}">
-        <p14:creationId xmlns:p14="http://schemas.microsoft.com/office/powerpoint/2010/main" val="1816614792"/>
-      </p:ext>
-    </p:extLst>
   </p:cSld>
   <p:clrMapOvr>
     <a:masterClrMapping/>
@@ -4494,13 +3973,7 @@
   <p:cSld>
     <p:spTree>
       <p:nvGrpSpPr>
-        <p:cNvPr id="1" name="">
-          <a:extLst>
-            <a:ext uri="{FF2B5EF4-FFF2-40B4-BE49-F238E27FC236}">
-              <a16:creationId xmlns:a16="http://schemas.microsoft.com/office/drawing/2014/main" id="{2204EF13-C1DA-DCA0-6FA7-7E00C751C9E5}"/>
-            </a:ext>
-          </a:extLst>
-        </p:cNvPr>
+        <p:cNvPr id="1" name=""/>
         <p:cNvGrpSpPr/>
         <p:nvPr/>
       </p:nvGrpSpPr>
@@ -4514,13 +3987,7 @@
       </p:grpSpPr>
       <p:sp>
         <p:nvSpPr>
-          <p:cNvPr id="2" name="Title 1">
-            <a:extLst>
-              <a:ext uri="{FF2B5EF4-FFF2-40B4-BE49-F238E27FC236}">
-                <a16:creationId xmlns:a16="http://schemas.microsoft.com/office/drawing/2014/main" id="{FBD3595F-08BB-D296-05F4-55CE6F598091}"/>
-              </a:ext>
-            </a:extLst>
-          </p:cNvPr>
+          <p:cNvPr id="2" name="Title 1"/>
           <p:cNvSpPr>
             <a:spLocks noGrp="1"/>
           </p:cNvSpPr>
@@ -4573,13 +4040,7 @@
       </p:sp>
       <p:sp>
         <p:nvSpPr>
-          <p:cNvPr id="3" name="Content Placeholder 2">
-            <a:extLst>
-              <a:ext uri="{FF2B5EF4-FFF2-40B4-BE49-F238E27FC236}">
-                <a16:creationId xmlns:a16="http://schemas.microsoft.com/office/drawing/2014/main" id="{F149F70F-F913-9163-79EE-CF3B13FF2396}"/>
-              </a:ext>
-            </a:extLst>
-          </p:cNvPr>
+          <p:cNvPr id="3" name="Content Placeholder 2"/>
           <p:cNvSpPr>
             <a:spLocks noGrp="1"/>
           </p:cNvSpPr>
@@ -4604,6 +4065,7 @@
               <a:rPr lang="en-US" sz="2400" b="1" dirty="0"/>
               <a:t>PROBLEM STAMENT:</a:t>
             </a:r>
+            <a:endParaRPr lang="en-US" sz="2400" b="1" dirty="0"/>
           </a:p>
           <a:p>
             <a:pPr lvl="0"/>
@@ -4611,6 +4073,7 @@
               <a:rPr lang="en-US" sz="2400" dirty="0"/>
               <a:t>To design a program that enables an AI to correctly guess a number chosen by the user between 1 and 100, using logical feedback such as “higher,” “lower,” or “correct” to minimize the number of attempts.</a:t>
             </a:r>
+            <a:endParaRPr lang="en-US" sz="2400" dirty="0"/>
           </a:p>
           <a:p>
             <a:pPr lvl="0"/>
@@ -4644,6 +4107,10 @@
               </a:rPr>
               <a:t>RESULT:</a:t>
             </a:r>
+            <a:endParaRPr lang="en-US" sz="2400" b="1" dirty="0">
+              <a:latin typeface="Calibri (Body)"/>
+              <a:cs typeface="Times New Roman" panose="02020603050405020304" pitchFamily="18" charset="0"/>
+            </a:endParaRPr>
           </a:p>
           <a:p>
             <a:r>
@@ -4657,24 +4124,28 @@
               <a:rPr lang="en-US" sz="2400" dirty="0"/>
               <a:t>Possible outcomes include:</a:t>
             </a:r>
+            <a:endParaRPr lang="en-US" sz="2400" dirty="0"/>
           </a:p>
           <a:p>
             <a:r>
               <a:rPr lang="en-US" sz="2400" dirty="0"/>
               <a:t>The AI correctly guesses the number using logical deductions.</a:t>
             </a:r>
+            <a:endParaRPr lang="en-US" sz="2400" dirty="0"/>
           </a:p>
           <a:p>
             <a:r>
               <a:rPr lang="en-US" sz="2400" dirty="0"/>
               <a:t>The user provides consistent feedback, leading to an efficient solution.</a:t>
             </a:r>
+            <a:endParaRPr lang="en-US" sz="2400" dirty="0"/>
           </a:p>
           <a:p>
             <a:r>
               <a:rPr lang="en-US" sz="2400" dirty="0"/>
               <a:t>Inconsistent feedback may cause repeated or incorrect guesses.</a:t>
             </a:r>
+            <a:endParaRPr lang="en-US" sz="2400" dirty="0"/>
           </a:p>
           <a:p>
             <a:pPr marL="0" indent="0">
@@ -4686,13 +4157,7 @@
       </p:sp>
       <p:sp>
         <p:nvSpPr>
-          <p:cNvPr id="4" name="Date Placeholder 3">
-            <a:extLst>
-              <a:ext uri="{FF2B5EF4-FFF2-40B4-BE49-F238E27FC236}">
-                <a16:creationId xmlns:a16="http://schemas.microsoft.com/office/drawing/2014/main" id="{6C06126F-5F8D-2489-F979-C191AD5F2A2A}"/>
-              </a:ext>
-            </a:extLst>
-          </p:cNvPr>
+          <p:cNvPr id="4" name="Date Placeholder 3"/>
           <p:cNvSpPr>
             <a:spLocks noGrp="1"/>
           </p:cNvSpPr>
@@ -4707,7 +4172,6 @@
           <a:p>
             <a:fld id="{316FBEDF-053F-468F-8CCF-D1ACE4FBB50D}" type="datetime1">
               <a:rPr lang="en-US" smtClean="0"/>
-              <a:t>10/27/2025</a:t>
             </a:fld>
             <a:endParaRPr lang="en-US"/>
           </a:p>
@@ -4715,13 +4179,7 @@
       </p:sp>
       <p:sp>
         <p:nvSpPr>
-          <p:cNvPr id="5" name="Slide Number Placeholder 4">
-            <a:extLst>
-              <a:ext uri="{FF2B5EF4-FFF2-40B4-BE49-F238E27FC236}">
-                <a16:creationId xmlns:a16="http://schemas.microsoft.com/office/drawing/2014/main" id="{BB0E75CF-C401-8531-A36F-E69E88CA1AA5}"/>
-              </a:ext>
-            </a:extLst>
-          </p:cNvPr>
+          <p:cNvPr id="5" name="Slide Number Placeholder 4"/>
           <p:cNvSpPr>
             <a:spLocks noGrp="1"/>
           </p:cNvSpPr>
@@ -4736,18 +4194,12 @@
           <a:p>
             <a:fld id="{1FCEF87E-815D-44D1-B0AB-39AF0402D6A8}" type="slidenum">
               <a:rPr lang="en-US" smtClean="0"/>
-              <a:t>3</a:t>
             </a:fld>
             <a:endParaRPr lang="en-US"/>
           </a:p>
         </p:txBody>
       </p:sp>
     </p:spTree>
-    <p:extLst>
-      <p:ext uri="{BB962C8B-B14F-4D97-AF65-F5344CB8AC3E}">
-        <p14:creationId xmlns:p14="http://schemas.microsoft.com/office/powerpoint/2010/main" val="432376501"/>
-      </p:ext>
-    </p:extLst>
   </p:cSld>
   <p:clrMapOvr>
     <a:masterClrMapping/>
@@ -4760,13 +4212,7 @@
   <p:cSld>
     <p:spTree>
       <p:nvGrpSpPr>
-        <p:cNvPr id="1" name="">
-          <a:extLst>
-            <a:ext uri="{FF2B5EF4-FFF2-40B4-BE49-F238E27FC236}">
-              <a16:creationId xmlns:a16="http://schemas.microsoft.com/office/drawing/2014/main" id="{83ACC068-5F54-97E8-2F1C-0538F112699A}"/>
-            </a:ext>
-          </a:extLst>
-        </p:cNvPr>
+        <p:cNvPr id="1" name=""/>
         <p:cNvGrpSpPr/>
         <p:nvPr/>
       </p:nvGrpSpPr>
@@ -4780,13 +4226,7 @@
       </p:grpSpPr>
       <p:sp>
         <p:nvSpPr>
-          <p:cNvPr id="2" name="Title 1">
-            <a:extLst>
-              <a:ext uri="{FF2B5EF4-FFF2-40B4-BE49-F238E27FC236}">
-                <a16:creationId xmlns:a16="http://schemas.microsoft.com/office/drawing/2014/main" id="{F7B2B1AF-B7ED-6DDA-888D-9BCAF08EA5E4}"/>
-              </a:ext>
-            </a:extLst>
-          </p:cNvPr>
+          <p:cNvPr id="2" name="Title 1"/>
           <p:cNvSpPr>
             <a:spLocks noGrp="1"/>
           </p:cNvSpPr>
@@ -4839,13 +4279,7 @@
       </p:sp>
       <p:sp>
         <p:nvSpPr>
-          <p:cNvPr id="3" name="Content Placeholder 2">
-            <a:extLst>
-              <a:ext uri="{FF2B5EF4-FFF2-40B4-BE49-F238E27FC236}">
-                <a16:creationId xmlns:a16="http://schemas.microsoft.com/office/drawing/2014/main" id="{FE67243E-1300-82BE-9968-6837E801AFFC}"/>
-              </a:ext>
-            </a:extLst>
-          </p:cNvPr>
+          <p:cNvPr id="3" name="Content Placeholder 2"/>
           <p:cNvSpPr>
             <a:spLocks noGrp="1"/>
           </p:cNvSpPr>
@@ -4897,6 +4331,7 @@
               <a:rPr lang="en-US" sz="2000" dirty="0"/>
               <a:t>, where decisions are made logically using available information to reach the correct result with minimal attempts.</a:t>
             </a:r>
+            <a:endParaRPr lang="en-US" sz="2000" dirty="0"/>
           </a:p>
           <a:p>
             <a:pPr marL="457200" lvl="1" indent="0">
@@ -4912,6 +4347,7 @@
               <a:rPr lang="en-US" sz="2000" b="1" dirty="0"/>
               <a:t>Algorithm with Example:</a:t>
             </a:r>
+            <a:endParaRPr lang="en-US" sz="2000" b="1" dirty="0"/>
           </a:p>
           <a:p>
             <a:r>
@@ -4926,6 +4362,7 @@
               <a:rPr lang="en-US" sz="2000" dirty="0"/>
               <a:t> and guesses the midpoint (50).</a:t>
             </a:r>
+            <a:endParaRPr lang="en-US" sz="2000" dirty="0"/>
           </a:p>
           <a:p>
             <a:r>
@@ -4940,6 +4377,7 @@
               <a:rPr lang="en-US" sz="2000" dirty="0"/>
               <a:t> the new range becomes 51–100.</a:t>
             </a:r>
+            <a:endParaRPr lang="en-US" sz="2000" dirty="0"/>
           </a:p>
           <a:p>
             <a:r>
@@ -4976,6 +4414,7 @@
               <a:rPr lang="en-US" sz="2000" dirty="0"/>
               <a:t>, the AI might guess 50 → 75 → 62 → 68 → 71 → 73 in just a few steps.</a:t>
             </a:r>
+            <a:endParaRPr lang="en-US" sz="2000" dirty="0"/>
           </a:p>
           <a:p>
             <a:endParaRPr lang="en-US" dirty="0"/>
@@ -4984,13 +4423,7 @@
       </p:sp>
       <p:sp>
         <p:nvSpPr>
-          <p:cNvPr id="4" name="Date Placeholder 3">
-            <a:extLst>
-              <a:ext uri="{FF2B5EF4-FFF2-40B4-BE49-F238E27FC236}">
-                <a16:creationId xmlns:a16="http://schemas.microsoft.com/office/drawing/2014/main" id="{4AF593AB-ABA6-D8E8-42D9-A38FB7B4DB45}"/>
-              </a:ext>
-            </a:extLst>
-          </p:cNvPr>
+          <p:cNvPr id="4" name="Date Placeholder 3"/>
           <p:cNvSpPr>
             <a:spLocks noGrp="1"/>
           </p:cNvSpPr>
@@ -5005,7 +4438,6 @@
           <a:p>
             <a:fld id="{316FBEDF-053F-468F-8CCF-D1ACE4FBB50D}" type="datetime1">
               <a:rPr lang="en-US" smtClean="0"/>
-              <a:t>10/27/2025</a:t>
             </a:fld>
             <a:endParaRPr lang="en-US"/>
           </a:p>
@@ -5013,13 +4445,7 @@
       </p:sp>
       <p:sp>
         <p:nvSpPr>
-          <p:cNvPr id="5" name="Slide Number Placeholder 4">
-            <a:extLst>
-              <a:ext uri="{FF2B5EF4-FFF2-40B4-BE49-F238E27FC236}">
-                <a16:creationId xmlns:a16="http://schemas.microsoft.com/office/drawing/2014/main" id="{40AE40CC-B05F-6325-A926-99504CD4A72F}"/>
-              </a:ext>
-            </a:extLst>
-          </p:cNvPr>
+          <p:cNvPr id="5" name="Slide Number Placeholder 4"/>
           <p:cNvSpPr>
             <a:spLocks noGrp="1"/>
           </p:cNvSpPr>
@@ -5034,18 +4460,12 @@
           <a:p>
             <a:fld id="{1FCEF87E-815D-44D1-B0AB-39AF0402D6A8}" type="slidenum">
               <a:rPr lang="en-US" smtClean="0"/>
-              <a:t>4</a:t>
             </a:fld>
             <a:endParaRPr lang="en-US"/>
           </a:p>
         </p:txBody>
       </p:sp>
     </p:spTree>
-    <p:extLst>
-      <p:ext uri="{BB962C8B-B14F-4D97-AF65-F5344CB8AC3E}">
-        <p14:creationId xmlns:p14="http://schemas.microsoft.com/office/powerpoint/2010/main" val="2832692384"/>
-      </p:ext>
-    </p:extLst>
   </p:cSld>
   <p:clrMapOvr>
     <a:masterClrMapping/>
@@ -5058,13 +4478,7 @@
   <p:cSld>
     <p:spTree>
       <p:nvGrpSpPr>
-        <p:cNvPr id="1" name="">
-          <a:extLst>
-            <a:ext uri="{FF2B5EF4-FFF2-40B4-BE49-F238E27FC236}">
-              <a16:creationId xmlns:a16="http://schemas.microsoft.com/office/drawing/2014/main" id="{B7D7EE86-06BF-4F57-288E-301F10F1E67E}"/>
-            </a:ext>
-          </a:extLst>
-        </p:cNvPr>
+        <p:cNvPr id="1" name=""/>
         <p:cNvGrpSpPr/>
         <p:nvPr/>
       </p:nvGrpSpPr>
@@ -5078,13 +4492,7 @@
       </p:grpSpPr>
       <p:sp>
         <p:nvSpPr>
-          <p:cNvPr id="2" name="Title 1">
-            <a:extLst>
-              <a:ext uri="{FF2B5EF4-FFF2-40B4-BE49-F238E27FC236}">
-                <a16:creationId xmlns:a16="http://schemas.microsoft.com/office/drawing/2014/main" id="{3C10CB5B-FB18-F005-3B88-43776E7ECEF0}"/>
-              </a:ext>
-            </a:extLst>
-          </p:cNvPr>
+          <p:cNvPr id="2" name="Title 1"/>
           <p:cNvSpPr>
             <a:spLocks noGrp="1"/>
           </p:cNvSpPr>
@@ -5137,13 +4545,7 @@
       </p:sp>
       <p:sp>
         <p:nvSpPr>
-          <p:cNvPr id="3" name="Content Placeholder 2">
-            <a:extLst>
-              <a:ext uri="{FF2B5EF4-FFF2-40B4-BE49-F238E27FC236}">
-                <a16:creationId xmlns:a16="http://schemas.microsoft.com/office/drawing/2014/main" id="{327BDC7C-1428-4E85-40E0-74710766F968}"/>
-              </a:ext>
-            </a:extLst>
-          </p:cNvPr>
+          <p:cNvPr id="3" name="Content Placeholder 2"/>
           <p:cNvSpPr>
             <a:spLocks noGrp="1"/>
           </p:cNvSpPr>
@@ -5170,6 +4572,7 @@
               <a:rPr lang="en-US" b="1" dirty="0"/>
               <a:t>LITERATURE SURVEY:</a:t>
             </a:r>
+            <a:endParaRPr lang="en-US" b="1" dirty="0"/>
           </a:p>
           <a:p>
             <a:pPr marL="457200" lvl="1" indent="0">
@@ -5227,6 +4630,9 @@
               </a:rPr>
               <a:t>) guesses by halving the interval each step — optimal for this exact interactive setting.</a:t>
             </a:r>
+            <a:endParaRPr lang="en-US" altLang="en-US" sz="2200" dirty="0">
+              <a:latin typeface="Arial" panose="020B0604020202020204" pitchFamily="34" charset="0"/>
+            </a:endParaRPr>
           </a:p>
           <a:p>
             <a:pPr marL="0" lvl="0" indent="0" eaLnBrk="0" fontAlgn="base" hangingPunct="0">
@@ -5272,6 +4678,9 @@
               </a:rPr>
               <a:t> Simple brute-force approach (1 → 100); requires O(n)O(n)O(n) guesses in worst case — educational but inefficient.</a:t>
             </a:r>
+            <a:endParaRPr lang="en-US" altLang="en-US" sz="2200" dirty="0">
+              <a:latin typeface="Arial" panose="020B0604020202020204" pitchFamily="34" charset="0"/>
+            </a:endParaRPr>
           </a:p>
           <a:p>
             <a:pPr marL="0" lvl="0" indent="0" eaLnBrk="0" fontAlgn="base" hangingPunct="0">
@@ -5317,6 +4726,9 @@
               </a:rPr>
               <a:t> Random selection with feedback; can be faster on average in some noisy scenarios but lacks the worst-case guarantees of binary search.</a:t>
             </a:r>
+            <a:endParaRPr lang="en-US" altLang="en-US" sz="2200" dirty="0">
+              <a:latin typeface="Arial" panose="020B0604020202020204" pitchFamily="34" charset="0"/>
+            </a:endParaRPr>
           </a:p>
           <a:p>
             <a:pPr marL="0" lvl="0" indent="0" eaLnBrk="0" fontAlgn="base" hangingPunct="0">
@@ -5362,6 +4774,9 @@
               </a:rPr>
               <a:t> Choose guesses to maximize expected information gain (minimize remaining entropy); generalizes binary search for uneven priors.</a:t>
             </a:r>
+            <a:endParaRPr lang="en-US" altLang="en-US" sz="2200" dirty="0">
+              <a:latin typeface="Arial" panose="020B0604020202020204" pitchFamily="34" charset="0"/>
+            </a:endParaRPr>
           </a:p>
           <a:p>
             <a:pPr marL="0" lvl="0" indent="0" eaLnBrk="0" fontAlgn="base" hangingPunct="0">
@@ -5406,6 +4821,9 @@
               </a:rPr>
               <a:t> Reinforcement learning or Bayesian inference can adapt to user patterns or noisy feedback, useful if feedback is inconsistent or biased.</a:t>
             </a:r>
+            <a:endParaRPr lang="en-US" altLang="en-US" sz="2200" dirty="0">
+              <a:latin typeface="Arial" panose="020B0604020202020204" pitchFamily="34" charset="0"/>
+            </a:endParaRPr>
           </a:p>
           <a:p>
             <a:pPr marL="0" indent="0">
@@ -5417,13 +4835,7 @@
       </p:sp>
       <p:sp>
         <p:nvSpPr>
-          <p:cNvPr id="4" name="Date Placeholder 3">
-            <a:extLst>
-              <a:ext uri="{FF2B5EF4-FFF2-40B4-BE49-F238E27FC236}">
-                <a16:creationId xmlns:a16="http://schemas.microsoft.com/office/drawing/2014/main" id="{89F9423E-665B-BC85-3300-697663B28681}"/>
-              </a:ext>
-            </a:extLst>
-          </p:cNvPr>
+          <p:cNvPr id="4" name="Date Placeholder 3"/>
           <p:cNvSpPr>
             <a:spLocks noGrp="1"/>
           </p:cNvSpPr>
@@ -5438,7 +4850,6 @@
           <a:p>
             <a:fld id="{316FBEDF-053F-468F-8CCF-D1ACE4FBB50D}" type="datetime1">
               <a:rPr lang="en-US" smtClean="0"/>
-              <a:t>10/27/2025</a:t>
             </a:fld>
             <a:endParaRPr lang="en-US"/>
           </a:p>
@@ -5446,13 +4857,7 @@
       </p:sp>
       <p:sp>
         <p:nvSpPr>
-          <p:cNvPr id="5" name="Slide Number Placeholder 4">
-            <a:extLst>
-              <a:ext uri="{FF2B5EF4-FFF2-40B4-BE49-F238E27FC236}">
-                <a16:creationId xmlns:a16="http://schemas.microsoft.com/office/drawing/2014/main" id="{6EBA8D11-41CC-8E98-3C74-2779F92C761E}"/>
-              </a:ext>
-            </a:extLst>
-          </p:cNvPr>
+          <p:cNvPr id="5" name="Slide Number Placeholder 4"/>
           <p:cNvSpPr>
             <a:spLocks noGrp="1"/>
           </p:cNvSpPr>
@@ -5467,18 +4872,12 @@
           <a:p>
             <a:fld id="{1FCEF87E-815D-44D1-B0AB-39AF0402D6A8}" type="slidenum">
               <a:rPr lang="en-US" smtClean="0"/>
-              <a:t>5</a:t>
             </a:fld>
             <a:endParaRPr lang="en-US"/>
           </a:p>
         </p:txBody>
       </p:sp>
     </p:spTree>
-    <p:extLst>
-      <p:ext uri="{BB962C8B-B14F-4D97-AF65-F5344CB8AC3E}">
-        <p14:creationId xmlns:p14="http://schemas.microsoft.com/office/powerpoint/2010/main" val="3410229886"/>
-      </p:ext>
-    </p:extLst>
   </p:cSld>
   <p:clrMapOvr>
     <a:masterClrMapping/>
@@ -5491,13 +4890,7 @@
   <p:cSld>
     <p:spTree>
       <p:nvGrpSpPr>
-        <p:cNvPr id="1" name="">
-          <a:extLst>
-            <a:ext uri="{FF2B5EF4-FFF2-40B4-BE49-F238E27FC236}">
-              <a16:creationId xmlns:a16="http://schemas.microsoft.com/office/drawing/2014/main" id="{C4A34F6B-2294-8100-6428-71DD4A23A3CE}"/>
-            </a:ext>
-          </a:extLst>
-        </p:cNvPr>
+        <p:cNvPr id="1" name=""/>
         <p:cNvGrpSpPr/>
         <p:nvPr/>
       </p:nvGrpSpPr>
@@ -5511,13 +4904,7 @@
       </p:grpSpPr>
       <p:sp>
         <p:nvSpPr>
-          <p:cNvPr id="2" name="Title 1">
-            <a:extLst>
-              <a:ext uri="{FF2B5EF4-FFF2-40B4-BE49-F238E27FC236}">
-                <a16:creationId xmlns:a16="http://schemas.microsoft.com/office/drawing/2014/main" id="{DE876350-5987-57CB-5096-A77DCA2009EF}"/>
-              </a:ext>
-            </a:extLst>
-          </p:cNvPr>
+          <p:cNvPr id="2" name="Title 1"/>
           <p:cNvSpPr>
             <a:spLocks noGrp="1"/>
           </p:cNvSpPr>
@@ -5570,13 +4957,7 @@
       </p:sp>
       <p:sp>
         <p:nvSpPr>
-          <p:cNvPr id="3" name="Content Placeholder 2">
-            <a:extLst>
-              <a:ext uri="{FF2B5EF4-FFF2-40B4-BE49-F238E27FC236}">
-                <a16:creationId xmlns:a16="http://schemas.microsoft.com/office/drawing/2014/main" id="{A229904C-7E5E-5862-ACA4-167CDBC5044B}"/>
-              </a:ext>
-            </a:extLst>
-          </p:cNvPr>
+          <p:cNvPr id="3" name="Content Placeholder 2"/>
           <p:cNvSpPr>
             <a:spLocks noGrp="1"/>
           </p:cNvSpPr>
@@ -5598,24 +4979,19 @@
               <a:rPr lang="en-GB" dirty="0"/>
               <a:t>Link to code in Git-hub Repository</a:t>
             </a:r>
-          </a:p>
-          <a:p>
             <a:endParaRPr lang="en-GB" dirty="0"/>
           </a:p>
           <a:p>
+            <a:endParaRPr lang="en-GB" dirty="0"/>
+          </a:p>
+          <a:p>
             <a:endParaRPr lang="en-US" dirty="0"/>
           </a:p>
         </p:txBody>
       </p:sp>
       <p:sp>
         <p:nvSpPr>
-          <p:cNvPr id="4" name="Date Placeholder 3">
-            <a:extLst>
-              <a:ext uri="{FF2B5EF4-FFF2-40B4-BE49-F238E27FC236}">
-                <a16:creationId xmlns:a16="http://schemas.microsoft.com/office/drawing/2014/main" id="{C0BC0E82-F7C5-E4B3-8BB9-1583AC631384}"/>
-              </a:ext>
-            </a:extLst>
-          </p:cNvPr>
+          <p:cNvPr id="4" name="Date Placeholder 3"/>
           <p:cNvSpPr>
             <a:spLocks noGrp="1"/>
           </p:cNvSpPr>
@@ -5630,7 +5006,6 @@
           <a:p>
             <a:fld id="{C5480D13-07B8-4CF5-901F-BD1025D74351}" type="datetime1">
               <a:rPr lang="en-US" smtClean="0"/>
-              <a:t>10/27/2025</a:t>
             </a:fld>
             <a:endParaRPr lang="en-US"/>
           </a:p>
@@ -5638,13 +5013,7 @@
       </p:sp>
       <p:sp>
         <p:nvSpPr>
-          <p:cNvPr id="5" name="Slide Number Placeholder 4">
-            <a:extLst>
-              <a:ext uri="{FF2B5EF4-FFF2-40B4-BE49-F238E27FC236}">
-                <a16:creationId xmlns:a16="http://schemas.microsoft.com/office/drawing/2014/main" id="{04775014-201C-1110-C957-46A30A1C2417}"/>
-              </a:ext>
-            </a:extLst>
-          </p:cNvPr>
+          <p:cNvPr id="5" name="Slide Number Placeholder 4"/>
           <p:cNvSpPr>
             <a:spLocks noGrp="1"/>
           </p:cNvSpPr>
@@ -5659,7 +5028,6 @@
           <a:p>
             <a:fld id="{1FCEF87E-815D-44D1-B0AB-39AF0402D6A8}" type="slidenum">
               <a:rPr lang="en-US" smtClean="0"/>
-              <a:t>6</a:t>
             </a:fld>
             <a:endParaRPr lang="en-US"/>
           </a:p>
@@ -5667,23 +5035,11 @@
       </p:sp>
       <p:graphicFrame>
         <p:nvGraphicFramePr>
-          <p:cNvPr id="7" name="Table 6">
-            <a:extLst>
-              <a:ext uri="{FF2B5EF4-FFF2-40B4-BE49-F238E27FC236}">
-                <a16:creationId xmlns:a16="http://schemas.microsoft.com/office/drawing/2014/main" id="{ACE64048-76D1-E559-97A6-1E9DA8CC9F64}"/>
-              </a:ext>
-            </a:extLst>
-          </p:cNvPr>
+          <p:cNvPr id="7" name="Table 6"/>
           <p:cNvGraphicFramePr>
             <a:graphicFrameLocks noGrp="1"/>
           </p:cNvGraphicFramePr>
-          <p:nvPr>
-            <p:extLst>
-              <p:ext uri="{D42A27DB-BD31-4B8C-83A1-F6EECF244321}">
-                <p14:modId xmlns:p14="http://schemas.microsoft.com/office/powerpoint/2010/main" val="2592676092"/>
-              </p:ext>
-            </p:extLst>
-          </p:nvPr>
+          <p:nvPr/>
         </p:nvGraphicFramePr>
         <p:xfrm>
           <a:off x="1854200" y="2205222"/>
@@ -5696,20 +5052,8 @@
                 <a:tableStyleId>{21E4AEA4-8DFA-4A89-87EB-49C32662AFE0}</a:tableStyleId>
               </a:tblPr>
               <a:tblGrid>
-                <a:gridCol w="3032432">
-                  <a:extLst>
-                    <a:ext uri="{9D8B030D-6E8A-4147-A177-3AD203B41FA5}">
-                      <a16:colId xmlns:a16="http://schemas.microsoft.com/office/drawing/2014/main" val="4052004335"/>
-                    </a:ext>
-                  </a:extLst>
-                </a:gridCol>
-                <a:gridCol w="6754762">
-                  <a:extLst>
-                    <a:ext uri="{9D8B030D-6E8A-4147-A177-3AD203B41FA5}">
-                      <a16:colId xmlns:a16="http://schemas.microsoft.com/office/drawing/2014/main" val="1251959847"/>
-                    </a:ext>
-                  </a:extLst>
-                </a:gridCol>
+                <a:gridCol w="3032432"/>
+                <a:gridCol w="6754762"/>
               </a:tblGrid>
               <a:tr h="0">
                 <a:tc>
@@ -5832,11 +5176,6 @@
                     <a:noFill/>
                   </a:tcPr>
                 </a:tc>
-                <a:extLst>
-                  <a:ext uri="{0D108BD9-81ED-4DB2-BD59-A6C34878D82A}">
-                    <a16:rowId xmlns:a16="http://schemas.microsoft.com/office/drawing/2014/main" val="3399369799"/>
-                  </a:ext>
-                </a:extLst>
               </a:tr>
               <a:tr h="370840">
                 <a:tc>
@@ -5912,6 +5251,11 @@
                         </a:rPr>
                         <a:t>https://github.com/jeeva287/number-guessing-game-in-AI/commit/aace41b4aaf87db9090376cf01ce2c193d5e92b7 </a:t>
                       </a:r>
+                      <a:endParaRPr lang="en-US" dirty="0">
+                        <a:solidFill>
+                          <a:schemeClr val="tx1"/>
+                        </a:solidFill>
+                      </a:endParaRPr>
                     </a:p>
                   </a:txBody>
                   <a:tcPr>
@@ -5954,11 +5298,6 @@
                     <a:noFill/>
                   </a:tcPr>
                 </a:tc>
-                <a:extLst>
-                  <a:ext uri="{0D108BD9-81ED-4DB2-BD59-A6C34878D82A}">
-                    <a16:rowId xmlns:a16="http://schemas.microsoft.com/office/drawing/2014/main" val="1996202207"/>
-                  </a:ext>
-                </a:extLst>
               </a:tr>
               <a:tr h="370840">
                 <a:tc>
@@ -6073,11 +5412,6 @@
                     <a:noFill/>
                   </a:tcPr>
                 </a:tc>
-                <a:extLst>
-                  <a:ext uri="{0D108BD9-81ED-4DB2-BD59-A6C34878D82A}">
-                    <a16:rowId xmlns:a16="http://schemas.microsoft.com/office/drawing/2014/main" val="2251050083"/>
-                  </a:ext>
-                </a:extLst>
               </a:tr>
               <a:tr h="370840">
                 <a:tc>
@@ -6145,7 +5479,15 @@
                     <a:bodyPr/>
                     <a:lstStyle/>
                     <a:p>
-                      <a:endParaRPr lang="en-US" dirty="0">
+                      <a:r>
+                        <a:rPr lang="en-US" altLang="en-GB" dirty="0">
+                          <a:solidFill>
+                            <a:schemeClr val="tx1"/>
+                          </a:solidFill>
+                        </a:rPr>
+                        <a:t>https://github.com/jeeva287/number-guessing-game-in-AI/blob/main/Number%20guessing%20game%20ppt.pptx</a:t>
+                      </a:r>
+                      <a:endParaRPr lang="en-US" altLang="en-GB" dirty="0">
                         <a:solidFill>
                           <a:schemeClr val="tx1"/>
                         </a:solidFill>
@@ -6192,22 +5534,12 @@
                     <a:noFill/>
                   </a:tcPr>
                 </a:tc>
-                <a:extLst>
-                  <a:ext uri="{0D108BD9-81ED-4DB2-BD59-A6C34878D82A}">
-                    <a16:rowId xmlns:a16="http://schemas.microsoft.com/office/drawing/2014/main" val="2807241712"/>
-                  </a:ext>
-                </a:extLst>
               </a:tr>
             </a:tbl>
           </a:graphicData>
         </a:graphic>
       </p:graphicFrame>
     </p:spTree>
-    <p:extLst>
-      <p:ext uri="{BB962C8B-B14F-4D97-AF65-F5344CB8AC3E}">
-        <p14:creationId xmlns:p14="http://schemas.microsoft.com/office/powerpoint/2010/main" val="519586359"/>
-      </p:ext>
-    </p:extLst>
   </p:cSld>
   <p:clrMapOvr>
     <a:masterClrMapping/>
@@ -6220,13 +5552,7 @@
   <p:cSld>
     <p:spTree>
       <p:nvGrpSpPr>
-        <p:cNvPr id="1" name="">
-          <a:extLst>
-            <a:ext uri="{FF2B5EF4-FFF2-40B4-BE49-F238E27FC236}">
-              <a16:creationId xmlns:a16="http://schemas.microsoft.com/office/drawing/2014/main" id="{7AF55069-71B1-83F0-E5F5-B02F8F577246}"/>
-            </a:ext>
-          </a:extLst>
-        </p:cNvPr>
+        <p:cNvPr id="1" name=""/>
         <p:cNvGrpSpPr/>
         <p:nvPr/>
       </p:nvGrpSpPr>
@@ -6240,13 +5566,7 @@
       </p:grpSpPr>
       <p:sp>
         <p:nvSpPr>
-          <p:cNvPr id="2" name="Title 1">
-            <a:extLst>
-              <a:ext uri="{FF2B5EF4-FFF2-40B4-BE49-F238E27FC236}">
-                <a16:creationId xmlns:a16="http://schemas.microsoft.com/office/drawing/2014/main" id="{1F358887-D4AD-6383-79D6-F528D34824D4}"/>
-              </a:ext>
-            </a:extLst>
-          </p:cNvPr>
+          <p:cNvPr id="2" name="Title 1"/>
           <p:cNvSpPr>
             <a:spLocks noGrp="1"/>
           </p:cNvSpPr>
@@ -6299,13 +5619,7 @@
       </p:sp>
       <p:sp>
         <p:nvSpPr>
-          <p:cNvPr id="3" name="Content Placeholder 2">
-            <a:extLst>
-              <a:ext uri="{FF2B5EF4-FFF2-40B4-BE49-F238E27FC236}">
-                <a16:creationId xmlns:a16="http://schemas.microsoft.com/office/drawing/2014/main" id="{CB511744-1841-7314-5231-7CC4C07DDED0}"/>
-              </a:ext>
-            </a:extLst>
-          </p:cNvPr>
+          <p:cNvPr id="3" name="Content Placeholder 2"/>
           <p:cNvSpPr>
             <a:spLocks noGrp="1"/>
           </p:cNvSpPr>
@@ -6346,6 +5660,7 @@
               <a:rPr lang="en-US" sz="2200" dirty="0"/>
               <a:t>It demonstrates the effectiveness of the binary search algorithm in decision-making and problem-solving.</a:t>
             </a:r>
+            <a:endParaRPr lang="en-US" sz="2200" dirty="0"/>
           </a:p>
           <a:p>
             <a:endParaRPr lang="en-US" sz="2200" dirty="0"/>
@@ -6373,6 +5688,7 @@
               <a:rPr lang="en-US" sz="2200" dirty="0"/>
               <a:t> for better user interaction.</a:t>
             </a:r>
+            <a:endParaRPr lang="en-US" sz="2200" dirty="0"/>
           </a:p>
           <a:p>
             <a:r>
@@ -6387,6 +5703,7 @@
               <a:rPr lang="en-US" sz="2200" dirty="0"/>
               <a:t> to predict more efficiently.</a:t>
             </a:r>
+            <a:endParaRPr lang="en-US" sz="2200" dirty="0"/>
           </a:p>
           <a:p>
             <a:r>
@@ -6409,18 +5726,13 @@
               <a:rPr lang="en-US" sz="2200" dirty="0"/>
               <a:t> for advanced gameplay.</a:t>
             </a:r>
-          </a:p>
-        </p:txBody>
-      </p:sp>
-      <p:sp>
-        <p:nvSpPr>
-          <p:cNvPr id="4" name="Date Placeholder 3">
-            <a:extLst>
-              <a:ext uri="{FF2B5EF4-FFF2-40B4-BE49-F238E27FC236}">
-                <a16:creationId xmlns:a16="http://schemas.microsoft.com/office/drawing/2014/main" id="{E47BACE5-322B-3F55-2CA9-8E1D4117021B}"/>
-              </a:ext>
-            </a:extLst>
-          </p:cNvPr>
+            <a:endParaRPr lang="en-US" sz="2200" dirty="0"/>
+          </a:p>
+        </p:txBody>
+      </p:sp>
+      <p:sp>
+        <p:nvSpPr>
+          <p:cNvPr id="4" name="Date Placeholder 3"/>
           <p:cNvSpPr>
             <a:spLocks noGrp="1"/>
           </p:cNvSpPr>
@@ -6435,7 +5747,6 @@
           <a:p>
             <a:fld id="{C5480D13-07B8-4CF5-901F-BD1025D74351}" type="datetime1">
               <a:rPr lang="en-US" smtClean="0"/>
-              <a:t>10/27/2025</a:t>
             </a:fld>
             <a:endParaRPr lang="en-US"/>
           </a:p>
@@ -6443,13 +5754,7 @@
       </p:sp>
       <p:sp>
         <p:nvSpPr>
-          <p:cNvPr id="5" name="Slide Number Placeholder 4">
-            <a:extLst>
-              <a:ext uri="{FF2B5EF4-FFF2-40B4-BE49-F238E27FC236}">
-                <a16:creationId xmlns:a16="http://schemas.microsoft.com/office/drawing/2014/main" id="{A7D1AF6B-7EFE-60E0-2350-AE083D01AD8A}"/>
-              </a:ext>
-            </a:extLst>
-          </p:cNvPr>
+          <p:cNvPr id="5" name="Slide Number Placeholder 4"/>
           <p:cNvSpPr>
             <a:spLocks noGrp="1"/>
           </p:cNvSpPr>
@@ -6464,18 +5769,12 @@
           <a:p>
             <a:fld id="{1FCEF87E-815D-44D1-B0AB-39AF0402D6A8}" type="slidenum">
               <a:rPr lang="en-US" smtClean="0"/>
-              <a:t>7</a:t>
             </a:fld>
             <a:endParaRPr lang="en-US"/>
           </a:p>
         </p:txBody>
       </p:sp>
     </p:spTree>
-    <p:extLst>
-      <p:ext uri="{BB962C8B-B14F-4D97-AF65-F5344CB8AC3E}">
-        <p14:creationId xmlns:p14="http://schemas.microsoft.com/office/powerpoint/2010/main" val="2805269521"/>
-      </p:ext>
-    </p:extLst>
   </p:cSld>
   <p:clrMapOvr>
     <a:masterClrMapping/>
@@ -6488,13 +5787,7 @@
   <p:cSld>
     <p:spTree>
       <p:nvGrpSpPr>
-        <p:cNvPr id="1" name="">
-          <a:extLst>
-            <a:ext uri="{FF2B5EF4-FFF2-40B4-BE49-F238E27FC236}">
-              <a16:creationId xmlns:a16="http://schemas.microsoft.com/office/drawing/2014/main" id="{CAD63ECA-B59E-8742-1165-9911D2A450C7}"/>
-            </a:ext>
-          </a:extLst>
-        </p:cNvPr>
+        <p:cNvPr id="1" name=""/>
         <p:cNvGrpSpPr/>
         <p:nvPr/>
       </p:nvGrpSpPr>
@@ -6508,13 +5801,7 @@
       </p:grpSpPr>
       <p:sp>
         <p:nvSpPr>
-          <p:cNvPr id="2" name="Title 1">
-            <a:extLst>
-              <a:ext uri="{FF2B5EF4-FFF2-40B4-BE49-F238E27FC236}">
-                <a16:creationId xmlns:a16="http://schemas.microsoft.com/office/drawing/2014/main" id="{DE0B2EF6-B936-B9EB-24E4-C84A062402DD}"/>
-              </a:ext>
-            </a:extLst>
-          </p:cNvPr>
+          <p:cNvPr id="2" name="Title 1"/>
           <p:cNvSpPr>
             <a:spLocks noGrp="1"/>
           </p:cNvSpPr>
@@ -6567,13 +5854,7 @@
       </p:sp>
       <p:sp>
         <p:nvSpPr>
-          <p:cNvPr id="3" name="Content Placeholder 2">
-            <a:extLst>
-              <a:ext uri="{FF2B5EF4-FFF2-40B4-BE49-F238E27FC236}">
-                <a16:creationId xmlns:a16="http://schemas.microsoft.com/office/drawing/2014/main" id="{4B9409AF-1BD6-CFDC-B172-AD3D38536AC2}"/>
-              </a:ext>
-            </a:extLst>
-          </p:cNvPr>
+          <p:cNvPr id="3" name="Content Placeholder 2"/>
           <p:cNvSpPr>
             <a:spLocks noGrp="1"/>
           </p:cNvSpPr>
@@ -6613,13 +5894,7 @@
       </p:sp>
       <p:sp>
         <p:nvSpPr>
-          <p:cNvPr id="4" name="Date Placeholder 3">
-            <a:extLst>
-              <a:ext uri="{FF2B5EF4-FFF2-40B4-BE49-F238E27FC236}">
-                <a16:creationId xmlns:a16="http://schemas.microsoft.com/office/drawing/2014/main" id="{04773938-5370-329C-27AB-D82ECB9D7128}"/>
-              </a:ext>
-            </a:extLst>
-          </p:cNvPr>
+          <p:cNvPr id="4" name="Date Placeholder 3"/>
           <p:cNvSpPr>
             <a:spLocks noGrp="1"/>
           </p:cNvSpPr>
@@ -6634,7 +5909,6 @@
           <a:p>
             <a:fld id="{C5480D13-07B8-4CF5-901F-BD1025D74351}" type="datetime1">
               <a:rPr lang="en-US" smtClean="0"/>
-              <a:t>10/27/2025</a:t>
             </a:fld>
             <a:endParaRPr lang="en-US"/>
           </a:p>
@@ -6642,13 +5916,7 @@
       </p:sp>
       <p:sp>
         <p:nvSpPr>
-          <p:cNvPr id="5" name="Slide Number Placeholder 4">
-            <a:extLst>
-              <a:ext uri="{FF2B5EF4-FFF2-40B4-BE49-F238E27FC236}">
-                <a16:creationId xmlns:a16="http://schemas.microsoft.com/office/drawing/2014/main" id="{E8A83B3C-8735-B8FC-8D50-B919B3471343}"/>
-              </a:ext>
-            </a:extLst>
-          </p:cNvPr>
+          <p:cNvPr id="5" name="Slide Number Placeholder 4"/>
           <p:cNvSpPr>
             <a:spLocks noGrp="1"/>
           </p:cNvSpPr>
@@ -6663,7 +5931,6 @@
           <a:p>
             <a:fld id="{1FCEF87E-815D-44D1-B0AB-39AF0402D6A8}" type="slidenum">
               <a:rPr lang="en-US" smtClean="0"/>
-              <a:t>8</a:t>
             </a:fld>
             <a:endParaRPr lang="en-US"/>
           </a:p>
@@ -6671,20 +5938,14 @@
       </p:sp>
       <p:pic>
         <p:nvPicPr>
-          <p:cNvPr id="7" name="Picture 6" descr="A screenshot of a computer&#10;&#10;AI-generated content may be incorrect.">
-            <a:extLst>
-              <a:ext uri="{FF2B5EF4-FFF2-40B4-BE49-F238E27FC236}">
-                <a16:creationId xmlns:a16="http://schemas.microsoft.com/office/drawing/2014/main" id="{F1BEB3D3-18C0-BD14-953C-1D17ADDD2222}"/>
-              </a:ext>
-            </a:extLst>
-          </p:cNvPr>
+          <p:cNvPr id="7" name="Picture 6" descr="A screenshot of a computer&#10;&#10;AI-generated content may be incorrect."/>
           <p:cNvPicPr>
             <a:picLocks noChangeAspect="1"/>
           </p:cNvPicPr>
           <p:nvPr/>
         </p:nvPicPr>
         <p:blipFill>
-          <a:blip r:embed="rId2">
+          <a:blip r:embed="rId1">
             <a:extLst>
               <a:ext uri="{28A0092B-C50C-407E-A947-70E740481C1C}">
                 <a14:useLocalDpi xmlns:a14="http://schemas.microsoft.com/office/drawing/2010/main" val="0"/>
@@ -6706,11 +5967,6 @@
         </p:spPr>
       </p:pic>
     </p:spTree>
-    <p:extLst>
-      <p:ext uri="{BB962C8B-B14F-4D97-AF65-F5344CB8AC3E}">
-        <p14:creationId xmlns:p14="http://schemas.microsoft.com/office/powerpoint/2010/main" val="1263363521"/>
-      </p:ext>
-    </p:extLst>
   </p:cSld>
   <p:clrMapOvr>
     <a:masterClrMapping/>
@@ -6723,13 +5979,7 @@
   <p:cSld>
     <p:spTree>
       <p:nvGrpSpPr>
-        <p:cNvPr id="1" name="">
-          <a:extLst>
-            <a:ext uri="{FF2B5EF4-FFF2-40B4-BE49-F238E27FC236}">
-              <a16:creationId xmlns:a16="http://schemas.microsoft.com/office/drawing/2014/main" id="{A9DEA9EE-5679-A557-E7BF-0A904D09771C}"/>
-            </a:ext>
-          </a:extLst>
-        </p:cNvPr>
+        <p:cNvPr id="1" name=""/>
         <p:cNvGrpSpPr/>
         <p:nvPr/>
       </p:nvGrpSpPr>
@@ -6743,13 +5993,7 @@
       </p:grpSpPr>
       <p:sp>
         <p:nvSpPr>
-          <p:cNvPr id="2" name="Title 1">
-            <a:extLst>
-              <a:ext uri="{FF2B5EF4-FFF2-40B4-BE49-F238E27FC236}">
-                <a16:creationId xmlns:a16="http://schemas.microsoft.com/office/drawing/2014/main" id="{A2BF6077-2697-7116-5A2C-99B8054B7FE2}"/>
-              </a:ext>
-            </a:extLst>
-          </p:cNvPr>
+          <p:cNvPr id="2" name="Title 1"/>
           <p:cNvSpPr>
             <a:spLocks noGrp="1"/>
           </p:cNvSpPr>
@@ -6802,13 +6046,7 @@
       </p:sp>
       <p:sp>
         <p:nvSpPr>
-          <p:cNvPr id="4" name="Date Placeholder 3">
-            <a:extLst>
-              <a:ext uri="{FF2B5EF4-FFF2-40B4-BE49-F238E27FC236}">
-                <a16:creationId xmlns:a16="http://schemas.microsoft.com/office/drawing/2014/main" id="{418721BC-42E2-4822-3086-5AF81F1A3726}"/>
-              </a:ext>
-            </a:extLst>
-          </p:cNvPr>
+          <p:cNvPr id="4" name="Date Placeholder 3"/>
           <p:cNvSpPr>
             <a:spLocks noGrp="1"/>
           </p:cNvSpPr>
@@ -6823,7 +6061,6 @@
           <a:p>
             <a:fld id="{C5480D13-07B8-4CF5-901F-BD1025D74351}" type="datetime1">
               <a:rPr lang="en-US" smtClean="0"/>
-              <a:t>10/27/2025</a:t>
             </a:fld>
             <a:endParaRPr lang="en-US"/>
           </a:p>
@@ -6831,13 +6068,7 @@
       </p:sp>
       <p:sp>
         <p:nvSpPr>
-          <p:cNvPr id="5" name="Slide Number Placeholder 4">
-            <a:extLst>
-              <a:ext uri="{FF2B5EF4-FFF2-40B4-BE49-F238E27FC236}">
-                <a16:creationId xmlns:a16="http://schemas.microsoft.com/office/drawing/2014/main" id="{60D8BC28-15FA-0C88-32FB-88458DEBBC23}"/>
-              </a:ext>
-            </a:extLst>
-          </p:cNvPr>
+          <p:cNvPr id="5" name="Slide Number Placeholder 4"/>
           <p:cNvSpPr>
             <a:spLocks noGrp="1"/>
           </p:cNvSpPr>
@@ -6852,7 +6083,6 @@
           <a:p>
             <a:fld id="{1FCEF87E-815D-44D1-B0AB-39AF0402D6A8}" type="slidenum">
               <a:rPr lang="en-US" smtClean="0"/>
-              <a:t>9</a:t>
             </a:fld>
             <a:endParaRPr lang="en-US"/>
           </a:p>
@@ -6860,13 +6090,7 @@
       </p:sp>
       <p:sp>
         <p:nvSpPr>
-          <p:cNvPr id="7" name="Rectangle 2">
-            <a:extLst>
-              <a:ext uri="{FF2B5EF4-FFF2-40B4-BE49-F238E27FC236}">
-                <a16:creationId xmlns:a16="http://schemas.microsoft.com/office/drawing/2014/main" id="{5292E29E-52E9-0299-8F65-D55800DE657E}"/>
-              </a:ext>
-            </a:extLst>
-          </p:cNvPr>
+          <p:cNvPr id="7" name="Rectangle 2"/>
           <p:cNvSpPr>
             <a:spLocks noGrp="1" noChangeArrowheads="1"/>
           </p:cNvSpPr>
@@ -6918,9 +6142,6 @@
         </p:spPr>
         <p:txBody>
           <a:bodyPr vert="horz" wrap="square" lIns="91440" tIns="45720" rIns="91440" bIns="45720" numCol="1" anchor="ctr" anchorCtr="0" compatLnSpc="1">
-            <a:prstTxWarp prst="textNoShape">
-              <a:avLst/>
-            </a:prstTxWarp>
             <a:spAutoFit/>
           </a:bodyPr>
           <a:lstStyle/>
@@ -6939,7 +6160,6 @@
               <a:buSzTx/>
               <a:buFontTx/>
               <a:buChar char="•"/>
-              <a:tabLst/>
             </a:pPr>
             <a:r>
               <a:rPr kumimoji="0" lang="en-US" altLang="en-US" sz="1800" b="1" i="0" u="none" strike="noStrike" cap="none" normalizeH="0" baseline="0" dirty="0">
@@ -6967,6 +6187,16 @@
               </a:rPr>
               <a:t> “Artificial Intelligence: A Modern Approach” by Stuart Russell and Peter Norvig – for understanding AI reasoning and decision-making.</a:t>
             </a:r>
+            <a:endParaRPr kumimoji="0" lang="en-US" altLang="en-US" sz="1800" b="0" i="0" u="none" strike="noStrike" cap="none" normalizeH="0" baseline="0" dirty="0">
+              <a:ln>
+                <a:noFill/>
+              </a:ln>
+              <a:solidFill>
+                <a:schemeClr val="tx1"/>
+              </a:solidFill>
+              <a:effectLst/>
+              <a:latin typeface="Arial" panose="020B0604020202020204" pitchFamily="34" charset="0"/>
+            </a:endParaRPr>
           </a:p>
           <a:p>
             <a:pPr marL="0" marR="0" lvl="0" indent="0" algn="l" defTabSz="914400" rtl="0" eaLnBrk="0" fontAlgn="base" latinLnBrk="0" hangingPunct="0">
@@ -6983,7 +6213,6 @@
               <a:buSzTx/>
               <a:buFontTx/>
               <a:buChar char="•"/>
-              <a:tabLst/>
             </a:pPr>
             <a:endParaRPr kumimoji="0" lang="en-US" altLang="en-US" sz="1800" b="0" i="0" u="none" strike="noStrike" cap="none" normalizeH="0" baseline="0" dirty="0">
               <a:ln>
@@ -7011,7 +6240,6 @@
               <a:buSzTx/>
               <a:buFontTx/>
               <a:buChar char="•"/>
-              <a:tabLst/>
             </a:pPr>
             <a:r>
               <a:rPr kumimoji="0" lang="en-US" altLang="en-US" sz="1800" b="1" i="0" u="none" strike="noStrike" cap="none" normalizeH="0" baseline="0" dirty="0">
@@ -7091,6 +6319,16 @@
               </a:rPr>
               <a:t> (https://www.geeksforgeeks.org/binary-search/) – for algorithm logic and pseudocode.</a:t>
             </a:r>
+            <a:endParaRPr kumimoji="0" lang="en-US" altLang="en-US" sz="1800" b="0" i="0" u="none" strike="noStrike" cap="none" normalizeH="0" baseline="0" dirty="0">
+              <a:ln>
+                <a:noFill/>
+              </a:ln>
+              <a:solidFill>
+                <a:schemeClr val="tx1"/>
+              </a:solidFill>
+              <a:effectLst/>
+              <a:latin typeface="Arial" panose="020B0604020202020204" pitchFamily="34" charset="0"/>
+            </a:endParaRPr>
           </a:p>
           <a:p>
             <a:pPr marL="0" marR="0" lvl="0" indent="0" algn="l" defTabSz="914400" rtl="0" eaLnBrk="0" fontAlgn="base" latinLnBrk="0" hangingPunct="0">
@@ -7107,7 +6345,6 @@
               <a:buSzTx/>
               <a:buFontTx/>
               <a:buChar char="•"/>
-              <a:tabLst/>
             </a:pPr>
             <a:endParaRPr kumimoji="0" lang="en-US" altLang="en-US" sz="1800" b="0" i="0" u="none" strike="noStrike" cap="none" normalizeH="0" baseline="0" dirty="0">
               <a:ln>
@@ -7135,7 +6372,6 @@
               <a:buSzTx/>
               <a:buFontTx/>
               <a:buChar char="•"/>
-              <a:tabLst/>
             </a:pPr>
             <a:r>
               <a:rPr kumimoji="0" lang="en-US" altLang="en-US" sz="1800" b="1" i="0" u="none" strike="noStrike" cap="none" normalizeH="0" baseline="0" dirty="0">
@@ -7163,6 +6399,16 @@
               </a:rPr>
               <a:t> “Python Programming for the Absolute Beginner” by Michael Dawson – for implementing Python-based games.</a:t>
             </a:r>
+            <a:endParaRPr kumimoji="0" lang="en-US" altLang="en-US" sz="1800" b="0" i="0" u="none" strike="noStrike" cap="none" normalizeH="0" baseline="0" dirty="0">
+              <a:ln>
+                <a:noFill/>
+              </a:ln>
+              <a:solidFill>
+                <a:schemeClr val="tx1"/>
+              </a:solidFill>
+              <a:effectLst/>
+              <a:latin typeface="Arial" panose="020B0604020202020204" pitchFamily="34" charset="0"/>
+            </a:endParaRPr>
           </a:p>
           <a:p>
             <a:pPr marL="0" marR="0" lvl="0" indent="0" algn="l" defTabSz="914400" rtl="0" eaLnBrk="0" fontAlgn="base" latinLnBrk="0" hangingPunct="0">
@@ -7179,7 +6425,6 @@
               <a:buSzTx/>
               <a:buFontTx/>
               <a:buChar char="•"/>
-              <a:tabLst/>
             </a:pPr>
             <a:endParaRPr kumimoji="0" lang="en-US" altLang="en-US" sz="1800" b="0" i="0" u="none" strike="noStrike" cap="none" normalizeH="0" baseline="0" dirty="0">
               <a:ln>
@@ -7207,7 +6452,6 @@
               <a:buSzTx/>
               <a:buFontTx/>
               <a:buChar char="•"/>
-              <a:tabLst/>
             </a:pPr>
             <a:r>
               <a:rPr kumimoji="0" lang="en-US" altLang="en-US" sz="1800" b="1" i="0" u="none" strike="noStrike" cap="none" normalizeH="0" baseline="0" dirty="0">
@@ -7261,6 +6505,16 @@
               </a:rPr>
               <a:t> (https://realpython.com/) – for user-input game logic.</a:t>
             </a:r>
+            <a:endParaRPr kumimoji="0" lang="en-US" altLang="en-US" sz="1800" b="0" i="0" u="none" strike="noStrike" cap="none" normalizeH="0" baseline="0" dirty="0">
+              <a:ln>
+                <a:noFill/>
+              </a:ln>
+              <a:solidFill>
+                <a:schemeClr val="tx1"/>
+              </a:solidFill>
+              <a:effectLst/>
+              <a:latin typeface="Arial" panose="020B0604020202020204" pitchFamily="34" charset="0"/>
+            </a:endParaRPr>
           </a:p>
           <a:p>
             <a:pPr marL="0" marR="0" lvl="0" indent="0" algn="l" defTabSz="914400" rtl="0" eaLnBrk="0" fontAlgn="base" latinLnBrk="0" hangingPunct="0">
@@ -7277,7 +6531,6 @@
               <a:buSzTx/>
               <a:buFontTx/>
               <a:buChar char="•"/>
-              <a:tabLst/>
             </a:pPr>
             <a:endParaRPr kumimoji="0" lang="en-US" altLang="en-US" sz="1800" b="0" i="0" u="none" strike="noStrike" cap="none" normalizeH="0" baseline="0" dirty="0">
               <a:ln>
@@ -7305,7 +6558,6 @@
               <a:buSzTx/>
               <a:buFontTx/>
               <a:buChar char="•"/>
-              <a:tabLst/>
             </a:pPr>
             <a:r>
               <a:rPr kumimoji="0" lang="en-US" altLang="en-US" sz="1800" b="1" i="0" u="none" strike="noStrike" cap="none" normalizeH="0" baseline="0" dirty="0">
@@ -7359,15 +6611,20 @@
               </a:rPr>
               <a:t> – for conceptual understanding of search optimization.</a:t>
             </a:r>
+            <a:endParaRPr kumimoji="0" lang="en-US" altLang="en-US" sz="1800" b="0" i="0" u="none" strike="noStrike" cap="none" normalizeH="0" baseline="0" dirty="0">
+              <a:ln>
+                <a:noFill/>
+              </a:ln>
+              <a:solidFill>
+                <a:schemeClr val="tx1"/>
+              </a:solidFill>
+              <a:effectLst/>
+              <a:latin typeface="Arial" panose="020B0604020202020204" pitchFamily="34" charset="0"/>
+            </a:endParaRPr>
           </a:p>
         </p:txBody>
       </p:sp>
     </p:spTree>
-    <p:extLst>
-      <p:ext uri="{BB962C8B-B14F-4D97-AF65-F5344CB8AC3E}">
-        <p14:creationId xmlns:p14="http://schemas.microsoft.com/office/powerpoint/2010/main" val="752607158"/>
-      </p:ext>
-    </p:extLst>
   </p:cSld>
   <p:clrMapOvr>
     <a:masterClrMapping/>
@@ -7418,7 +6675,7 @@
     </a:clrScheme>
     <a:fontScheme name="Office">
       <a:majorFont>
-        <a:latin typeface="Calibri Light" panose="020F0302020204030204"/>
+        <a:latin typeface="Calibri Light"/>
         <a:ea typeface=""/>
         <a:cs typeface=""/>
         <a:font script="Jpan" typeface="游ゴシック Light"/>
@@ -7451,26 +6708,9 @@
         <a:font script="Viet" typeface="Times New Roman"/>
         <a:font script="Uigh" typeface="Microsoft Uighur"/>
         <a:font script="Geor" typeface="Sylfaen"/>
-        <a:font script="Armn" typeface="Arial"/>
-        <a:font script="Bugi" typeface="Leelawadee UI"/>
-        <a:font script="Bopo" typeface="Microsoft JhengHei"/>
-        <a:font script="Java" typeface="Javanese Text"/>
-        <a:font script="Lisu" typeface="Segoe UI"/>
-        <a:font script="Mymr" typeface="Myanmar Text"/>
-        <a:font script="Nkoo" typeface="Ebrima"/>
-        <a:font script="Olck" typeface="Nirmala UI"/>
-        <a:font script="Osma" typeface="Ebrima"/>
-        <a:font script="Phag" typeface="Phagspa"/>
-        <a:font script="Syrn" typeface="Estrangelo Edessa"/>
-        <a:font script="Syrj" typeface="Estrangelo Edessa"/>
-        <a:font script="Syre" typeface="Estrangelo Edessa"/>
-        <a:font script="Sora" typeface="Nirmala UI"/>
-        <a:font script="Tale" typeface="Microsoft Tai Le"/>
-        <a:font script="Talu" typeface="Microsoft New Tai Lue"/>
-        <a:font script="Tfng" typeface="Ebrima"/>
       </a:majorFont>
       <a:minorFont>
-        <a:latin typeface="Calibri" panose="020F0502020204030204"/>
+        <a:latin typeface="Calibri"/>
         <a:ea typeface=""/>
         <a:cs typeface=""/>
         <a:font script="Jpan" typeface="游ゴシック"/>
@@ -7503,23 +6743,6 @@
         <a:font script="Viet" typeface="Arial"/>
         <a:font script="Uigh" typeface="Microsoft Uighur"/>
         <a:font script="Geor" typeface="Sylfaen"/>
-        <a:font script="Armn" typeface="Arial"/>
-        <a:font script="Bugi" typeface="Leelawadee UI"/>
-        <a:font script="Bopo" typeface="Microsoft JhengHei"/>
-        <a:font script="Java" typeface="Javanese Text"/>
-        <a:font script="Lisu" typeface="Segoe UI"/>
-        <a:font script="Mymr" typeface="Myanmar Text"/>
-        <a:font script="Nkoo" typeface="Ebrima"/>
-        <a:font script="Olck" typeface="Nirmala UI"/>
-        <a:font script="Osma" typeface="Ebrima"/>
-        <a:font script="Phag" typeface="Phagspa"/>
-        <a:font script="Syrn" typeface="Estrangelo Edessa"/>
-        <a:font script="Syrj" typeface="Estrangelo Edessa"/>
-        <a:font script="Syre" typeface="Estrangelo Edessa"/>
-        <a:font script="Sora" typeface="Nirmala UI"/>
-        <a:font script="Tale" typeface="Microsoft Tai Le"/>
-        <a:font script="Talu" typeface="Microsoft New Tai Lue"/>
-        <a:font script="Tfng" typeface="Ebrima"/>
       </a:minorFont>
     </a:fontScheme>
     <a:fmtScheme name="Office">
@@ -7660,8 +6883,6 @@
       </a:bgFillStyleLst>
     </a:fmtScheme>
   </a:themeElements>
-  <a:objectDefaults/>
-  <a:extraClrSchemeLst/>
   <a:extLst>
     <a:ext uri="{05A4C25C-085E-4340-85A3-A5531E510DB2}">
       <thm15:themeFamily xmlns:thm15="http://schemas.microsoft.com/office/thememl/2012/main" name="Office Theme" id="{62F939B6-93AF-4DB8-9C6B-D6C7DFDC589F}" vid="{4A3C46E8-61CC-4603-A589-7422A47A8E4A}"/>
@@ -7713,7 +6934,7 @@
     </a:clrScheme>
     <a:fontScheme name="Office">
       <a:majorFont>
-        <a:latin typeface="Calibri Light" panose="020F0302020204030204"/>
+        <a:latin typeface="Calibri Light"/>
         <a:ea typeface=""/>
         <a:cs typeface=""/>
         <a:font script="Jpan" typeface="游ゴシック Light"/>
@@ -7746,26 +6967,9 @@
         <a:font script="Viet" typeface="Times New Roman"/>
         <a:font script="Uigh" typeface="Microsoft Uighur"/>
         <a:font script="Geor" typeface="Sylfaen"/>
-        <a:font script="Armn" typeface="Arial"/>
-        <a:font script="Bugi" typeface="Leelawadee UI"/>
-        <a:font script="Bopo" typeface="Microsoft JhengHei"/>
-        <a:font script="Java" typeface="Javanese Text"/>
-        <a:font script="Lisu" typeface="Segoe UI"/>
-        <a:font script="Mymr" typeface="Myanmar Text"/>
-        <a:font script="Nkoo" typeface="Ebrima"/>
-        <a:font script="Olck" typeface="Nirmala UI"/>
-        <a:font script="Osma" typeface="Ebrima"/>
-        <a:font script="Phag" typeface="Phagspa"/>
-        <a:font script="Syrn" typeface="Estrangelo Edessa"/>
-        <a:font script="Syrj" typeface="Estrangelo Edessa"/>
-        <a:font script="Syre" typeface="Estrangelo Edessa"/>
-        <a:font script="Sora" typeface="Nirmala UI"/>
-        <a:font script="Tale" typeface="Microsoft Tai Le"/>
-        <a:font script="Talu" typeface="Microsoft New Tai Lue"/>
-        <a:font script="Tfng" typeface="Ebrima"/>
       </a:majorFont>
       <a:minorFont>
-        <a:latin typeface="Calibri" panose="020F0502020204030204"/>
+        <a:latin typeface="Calibri"/>
         <a:ea typeface=""/>
         <a:cs typeface=""/>
         <a:font script="Jpan" typeface="游ゴシック"/>
@@ -7798,23 +7002,6 @@
         <a:font script="Viet" typeface="Arial"/>
         <a:font script="Uigh" typeface="Microsoft Uighur"/>
         <a:font script="Geor" typeface="Sylfaen"/>
-        <a:font script="Armn" typeface="Arial"/>
-        <a:font script="Bugi" typeface="Leelawadee UI"/>
-        <a:font script="Bopo" typeface="Microsoft JhengHei"/>
-        <a:font script="Java" typeface="Javanese Text"/>
-        <a:font script="Lisu" typeface="Segoe UI"/>
-        <a:font script="Mymr" typeface="Myanmar Text"/>
-        <a:font script="Nkoo" typeface="Ebrima"/>
-        <a:font script="Olck" typeface="Nirmala UI"/>
-        <a:font script="Osma" typeface="Ebrima"/>
-        <a:font script="Phag" typeface="Phagspa"/>
-        <a:font script="Syrn" typeface="Estrangelo Edessa"/>
-        <a:font script="Syrj" typeface="Estrangelo Edessa"/>
-        <a:font script="Syre" typeface="Estrangelo Edessa"/>
-        <a:font script="Sora" typeface="Nirmala UI"/>
-        <a:font script="Tale" typeface="Microsoft Tai Le"/>
-        <a:font script="Talu" typeface="Microsoft New Tai Lue"/>
-        <a:font script="Tfng" typeface="Ebrima"/>
       </a:minorFont>
     </a:fontScheme>
     <a:fmtScheme name="Office">
@@ -7955,8 +7142,6 @@
       </a:bgFillStyleLst>
     </a:fmtScheme>
   </a:themeElements>
-  <a:objectDefaults/>
-  <a:extraClrSchemeLst/>
   <a:extLst>
     <a:ext uri="{05A4C25C-085E-4340-85A3-A5531E510DB2}">
       <thm15:themeFamily xmlns:thm15="http://schemas.microsoft.com/office/thememl/2012/main" name="Office Theme" id="{62F939B6-93AF-4DB8-9C6B-D6C7DFDC589F}" vid="{4A3C46E8-61CC-4603-A589-7422A47A8E4A}"/>

</xml_diff>